<commit_message>
Reduced version, three slides (+ comments) only.
</commit_message>
<xml_diff>
--- a/presentations/Presi-Teil_Jan.pptx
+++ b/presentations/Presi-Teil_Jan.pptx
@@ -4,14 +4,13 @@
   <p:sldMasterIdLst>
     <p:sldMasterId id="2147483648" r:id="rId1"/>
   </p:sldMasterIdLst>
+  <p:notesMasterIdLst>
+    <p:notesMasterId r:id="rId5"/>
+  </p:notesMasterIdLst>
   <p:sldIdLst>
     <p:sldId id="258" r:id="rId2"/>
-    <p:sldId id="259" r:id="rId3"/>
-    <p:sldId id="264" r:id="rId4"/>
-    <p:sldId id="260" r:id="rId5"/>
-    <p:sldId id="261" r:id="rId6"/>
-    <p:sldId id="263" r:id="rId7"/>
-    <p:sldId id="262" r:id="rId8"/>
+    <p:sldId id="261" r:id="rId3"/>
+    <p:sldId id="262" r:id="rId4"/>
   </p:sldIdLst>
   <p:sldSz cx="9144000" cy="6858000" type="screen4x3"/>
   <p:notesSz cx="6858000" cy="9144000"/>
@@ -111,6 +110,876 @@
     </a:lvl9pPr>
   </p:defaultTextStyle>
 </p:presentation>
+</file>
+
+<file path=ppt/notesMasters/notesMaster1.xml><?xml version="1.0" encoding="utf-8"?>
+<p:notesMaster xmlns:a="http://schemas.openxmlformats.org/drawingml/2006/main" xmlns:r="http://schemas.openxmlformats.org/officeDocument/2006/relationships" xmlns:p="http://schemas.openxmlformats.org/presentationml/2006/main">
+  <p:cSld>
+    <p:bg>
+      <p:bgRef idx="1001">
+        <a:schemeClr val="bg1"/>
+      </p:bgRef>
+    </p:bg>
+    <p:spTree>
+      <p:nvGrpSpPr>
+        <p:cNvPr id="1" name=""/>
+        <p:cNvGrpSpPr/>
+        <p:nvPr/>
+      </p:nvGrpSpPr>
+      <p:grpSpPr>
+        <a:xfrm>
+          <a:off x="0" y="0"/>
+          <a:ext cx="0" cy="0"/>
+          <a:chOff x="0" y="0"/>
+          <a:chExt cx="0" cy="0"/>
+        </a:xfrm>
+      </p:grpSpPr>
+      <p:sp>
+        <p:nvSpPr>
+          <p:cNvPr id="2" name="Kopfzeilenplatzhalter 1"/>
+          <p:cNvSpPr>
+            <a:spLocks noGrp="1"/>
+          </p:cNvSpPr>
+          <p:nvPr>
+            <p:ph type="hdr" sz="quarter"/>
+          </p:nvPr>
+        </p:nvSpPr>
+        <p:spPr>
+          <a:xfrm>
+            <a:off x="0" y="0"/>
+            <a:ext cx="2971800" cy="457200"/>
+          </a:xfrm>
+          <a:prstGeom prst="rect">
+            <a:avLst/>
+          </a:prstGeom>
+        </p:spPr>
+        <p:txBody>
+          <a:bodyPr vert="horz" lIns="91440" tIns="45720" rIns="91440" bIns="45720" rtlCol="0"/>
+          <a:lstStyle>
+            <a:lvl1pPr algn="l">
+              <a:defRPr sz="1200"/>
+            </a:lvl1pPr>
+          </a:lstStyle>
+          <a:p>
+            <a:endParaRPr lang="de-DE"/>
+          </a:p>
+        </p:txBody>
+      </p:sp>
+      <p:sp>
+        <p:nvSpPr>
+          <p:cNvPr id="3" name="Datumsplatzhalter 2"/>
+          <p:cNvSpPr>
+            <a:spLocks noGrp="1"/>
+          </p:cNvSpPr>
+          <p:nvPr>
+            <p:ph type="dt" idx="1"/>
+          </p:nvPr>
+        </p:nvSpPr>
+        <p:spPr>
+          <a:xfrm>
+            <a:off x="3884613" y="0"/>
+            <a:ext cx="2971800" cy="457200"/>
+          </a:xfrm>
+          <a:prstGeom prst="rect">
+            <a:avLst/>
+          </a:prstGeom>
+        </p:spPr>
+        <p:txBody>
+          <a:bodyPr vert="horz" lIns="91440" tIns="45720" rIns="91440" bIns="45720" rtlCol="0"/>
+          <a:lstStyle>
+            <a:lvl1pPr algn="r">
+              <a:defRPr sz="1200"/>
+            </a:lvl1pPr>
+          </a:lstStyle>
+          <a:p>
+            <a:fld id="{77690944-D797-450C-B941-F291F820FB86}" type="datetimeFigureOut">
+              <a:rPr lang="de-DE" smtClean="0"/>
+              <a:t>09.12.2013</a:t>
+            </a:fld>
+            <a:endParaRPr lang="de-DE"/>
+          </a:p>
+        </p:txBody>
+      </p:sp>
+      <p:sp>
+        <p:nvSpPr>
+          <p:cNvPr id="4" name="Folienbildplatzhalter 3"/>
+          <p:cNvSpPr>
+            <a:spLocks noGrp="1" noRot="1" noChangeAspect="1"/>
+          </p:cNvSpPr>
+          <p:nvPr>
+            <p:ph type="sldImg" idx="2"/>
+          </p:nvPr>
+        </p:nvSpPr>
+        <p:spPr>
+          <a:xfrm>
+            <a:off x="1143000" y="685800"/>
+            <a:ext cx="4572000" cy="3429000"/>
+          </a:xfrm>
+          <a:prstGeom prst="rect">
+            <a:avLst/>
+          </a:prstGeom>
+          <a:noFill/>
+          <a:ln w="12700">
+            <a:solidFill>
+              <a:prstClr val="black"/>
+            </a:solidFill>
+          </a:ln>
+        </p:spPr>
+        <p:txBody>
+          <a:bodyPr vert="horz" lIns="91440" tIns="45720" rIns="91440" bIns="45720" rtlCol="0" anchor="ctr"/>
+          <a:lstStyle/>
+          <a:p>
+            <a:endParaRPr lang="de-DE"/>
+          </a:p>
+        </p:txBody>
+      </p:sp>
+      <p:sp>
+        <p:nvSpPr>
+          <p:cNvPr id="5" name="Notizenplatzhalter 4"/>
+          <p:cNvSpPr>
+            <a:spLocks noGrp="1"/>
+          </p:cNvSpPr>
+          <p:nvPr>
+            <p:ph type="body" sz="quarter" idx="3"/>
+          </p:nvPr>
+        </p:nvSpPr>
+        <p:spPr>
+          <a:xfrm>
+            <a:off x="685800" y="4343400"/>
+            <a:ext cx="5486400" cy="4114800"/>
+          </a:xfrm>
+          <a:prstGeom prst="rect">
+            <a:avLst/>
+          </a:prstGeom>
+        </p:spPr>
+        <p:txBody>
+          <a:bodyPr vert="horz" lIns="91440" tIns="45720" rIns="91440" bIns="45720" rtlCol="0"/>
+          <a:lstStyle/>
+          <a:p>
+            <a:pPr lvl="0"/>
+            <a:r>
+              <a:rPr lang="de-DE" smtClean="0"/>
+              <a:t>Textmasterformat bearbeiten</a:t>
+            </a:r>
+          </a:p>
+          <a:p>
+            <a:pPr lvl="1"/>
+            <a:r>
+              <a:rPr lang="de-DE" smtClean="0"/>
+              <a:t>Zweite Ebene</a:t>
+            </a:r>
+          </a:p>
+          <a:p>
+            <a:pPr lvl="2"/>
+            <a:r>
+              <a:rPr lang="de-DE" smtClean="0"/>
+              <a:t>Dritte Ebene</a:t>
+            </a:r>
+          </a:p>
+          <a:p>
+            <a:pPr lvl="3"/>
+            <a:r>
+              <a:rPr lang="de-DE" smtClean="0"/>
+              <a:t>Vierte Ebene</a:t>
+            </a:r>
+          </a:p>
+          <a:p>
+            <a:pPr lvl="4"/>
+            <a:r>
+              <a:rPr lang="de-DE" smtClean="0"/>
+              <a:t>Fünfte Ebene</a:t>
+            </a:r>
+            <a:endParaRPr lang="de-DE"/>
+          </a:p>
+        </p:txBody>
+      </p:sp>
+      <p:sp>
+        <p:nvSpPr>
+          <p:cNvPr id="6" name="Fußzeilenplatzhalter 5"/>
+          <p:cNvSpPr>
+            <a:spLocks noGrp="1"/>
+          </p:cNvSpPr>
+          <p:nvPr>
+            <p:ph type="ftr" sz="quarter" idx="4"/>
+          </p:nvPr>
+        </p:nvSpPr>
+        <p:spPr>
+          <a:xfrm>
+            <a:off x="0" y="8685213"/>
+            <a:ext cx="2971800" cy="457200"/>
+          </a:xfrm>
+          <a:prstGeom prst="rect">
+            <a:avLst/>
+          </a:prstGeom>
+        </p:spPr>
+        <p:txBody>
+          <a:bodyPr vert="horz" lIns="91440" tIns="45720" rIns="91440" bIns="45720" rtlCol="0" anchor="b"/>
+          <a:lstStyle>
+            <a:lvl1pPr algn="l">
+              <a:defRPr sz="1200"/>
+            </a:lvl1pPr>
+          </a:lstStyle>
+          <a:p>
+            <a:endParaRPr lang="de-DE"/>
+          </a:p>
+        </p:txBody>
+      </p:sp>
+      <p:sp>
+        <p:nvSpPr>
+          <p:cNvPr id="7" name="Foliennummernplatzhalter 6"/>
+          <p:cNvSpPr>
+            <a:spLocks noGrp="1"/>
+          </p:cNvSpPr>
+          <p:nvPr>
+            <p:ph type="sldNum" sz="quarter" idx="5"/>
+          </p:nvPr>
+        </p:nvSpPr>
+        <p:spPr>
+          <a:xfrm>
+            <a:off x="3884613" y="8685213"/>
+            <a:ext cx="2971800" cy="457200"/>
+          </a:xfrm>
+          <a:prstGeom prst="rect">
+            <a:avLst/>
+          </a:prstGeom>
+        </p:spPr>
+        <p:txBody>
+          <a:bodyPr vert="horz" lIns="91440" tIns="45720" rIns="91440" bIns="45720" rtlCol="0" anchor="b"/>
+          <a:lstStyle>
+            <a:lvl1pPr algn="r">
+              <a:defRPr sz="1200"/>
+            </a:lvl1pPr>
+          </a:lstStyle>
+          <a:p>
+            <a:fld id="{0673C40A-F867-4247-B469-DE0451605248}" type="slidenum">
+              <a:rPr lang="de-DE" smtClean="0"/>
+              <a:t>‹Nr.›</a:t>
+            </a:fld>
+            <a:endParaRPr lang="de-DE"/>
+          </a:p>
+        </p:txBody>
+      </p:sp>
+    </p:spTree>
+    <p:extLst>
+      <p:ext uri="{BB962C8B-B14F-4D97-AF65-F5344CB8AC3E}">
+        <p14:creationId xmlns:p14="http://schemas.microsoft.com/office/powerpoint/2010/main" val="2281885351"/>
+      </p:ext>
+    </p:extLst>
+  </p:cSld>
+  <p:clrMap bg1="lt1" tx1="dk1" bg2="lt2" tx2="dk2" accent1="accent1" accent2="accent2" accent3="accent3" accent4="accent4" accent5="accent5" accent6="accent6" hlink="hlink" folHlink="folHlink"/>
+  <p:notesStyle>
+    <a:lvl1pPr marL="0" algn="l" defTabSz="914400" rtl="0" eaLnBrk="1" latinLnBrk="0" hangingPunct="1">
+      <a:defRPr sz="1200" kern="1200">
+        <a:solidFill>
+          <a:schemeClr val="tx1"/>
+        </a:solidFill>
+        <a:latin typeface="+mn-lt"/>
+        <a:ea typeface="+mn-ea"/>
+        <a:cs typeface="+mn-cs"/>
+      </a:defRPr>
+    </a:lvl1pPr>
+    <a:lvl2pPr marL="457200" algn="l" defTabSz="914400" rtl="0" eaLnBrk="1" latinLnBrk="0" hangingPunct="1">
+      <a:defRPr sz="1200" kern="1200">
+        <a:solidFill>
+          <a:schemeClr val="tx1"/>
+        </a:solidFill>
+        <a:latin typeface="+mn-lt"/>
+        <a:ea typeface="+mn-ea"/>
+        <a:cs typeface="+mn-cs"/>
+      </a:defRPr>
+    </a:lvl2pPr>
+    <a:lvl3pPr marL="914400" algn="l" defTabSz="914400" rtl="0" eaLnBrk="1" latinLnBrk="0" hangingPunct="1">
+      <a:defRPr sz="1200" kern="1200">
+        <a:solidFill>
+          <a:schemeClr val="tx1"/>
+        </a:solidFill>
+        <a:latin typeface="+mn-lt"/>
+        <a:ea typeface="+mn-ea"/>
+        <a:cs typeface="+mn-cs"/>
+      </a:defRPr>
+    </a:lvl3pPr>
+    <a:lvl4pPr marL="1371600" algn="l" defTabSz="914400" rtl="0" eaLnBrk="1" latinLnBrk="0" hangingPunct="1">
+      <a:defRPr sz="1200" kern="1200">
+        <a:solidFill>
+          <a:schemeClr val="tx1"/>
+        </a:solidFill>
+        <a:latin typeface="+mn-lt"/>
+        <a:ea typeface="+mn-ea"/>
+        <a:cs typeface="+mn-cs"/>
+      </a:defRPr>
+    </a:lvl4pPr>
+    <a:lvl5pPr marL="1828800" algn="l" defTabSz="914400" rtl="0" eaLnBrk="1" latinLnBrk="0" hangingPunct="1">
+      <a:defRPr sz="1200" kern="1200">
+        <a:solidFill>
+          <a:schemeClr val="tx1"/>
+        </a:solidFill>
+        <a:latin typeface="+mn-lt"/>
+        <a:ea typeface="+mn-ea"/>
+        <a:cs typeface="+mn-cs"/>
+      </a:defRPr>
+    </a:lvl5pPr>
+    <a:lvl6pPr marL="2286000" algn="l" defTabSz="914400" rtl="0" eaLnBrk="1" latinLnBrk="0" hangingPunct="1">
+      <a:defRPr sz="1200" kern="1200">
+        <a:solidFill>
+          <a:schemeClr val="tx1"/>
+        </a:solidFill>
+        <a:latin typeface="+mn-lt"/>
+        <a:ea typeface="+mn-ea"/>
+        <a:cs typeface="+mn-cs"/>
+      </a:defRPr>
+    </a:lvl6pPr>
+    <a:lvl7pPr marL="2743200" algn="l" defTabSz="914400" rtl="0" eaLnBrk="1" latinLnBrk="0" hangingPunct="1">
+      <a:defRPr sz="1200" kern="1200">
+        <a:solidFill>
+          <a:schemeClr val="tx1"/>
+        </a:solidFill>
+        <a:latin typeface="+mn-lt"/>
+        <a:ea typeface="+mn-ea"/>
+        <a:cs typeface="+mn-cs"/>
+      </a:defRPr>
+    </a:lvl7pPr>
+    <a:lvl8pPr marL="3200400" algn="l" defTabSz="914400" rtl="0" eaLnBrk="1" latinLnBrk="0" hangingPunct="1">
+      <a:defRPr sz="1200" kern="1200">
+        <a:solidFill>
+          <a:schemeClr val="tx1"/>
+        </a:solidFill>
+        <a:latin typeface="+mn-lt"/>
+        <a:ea typeface="+mn-ea"/>
+        <a:cs typeface="+mn-cs"/>
+      </a:defRPr>
+    </a:lvl8pPr>
+    <a:lvl9pPr marL="3657600" algn="l" defTabSz="914400" rtl="0" eaLnBrk="1" latinLnBrk="0" hangingPunct="1">
+      <a:defRPr sz="1200" kern="1200">
+        <a:solidFill>
+          <a:schemeClr val="tx1"/>
+        </a:solidFill>
+        <a:latin typeface="+mn-lt"/>
+        <a:ea typeface="+mn-ea"/>
+        <a:cs typeface="+mn-cs"/>
+      </a:defRPr>
+    </a:lvl9pPr>
+  </p:notesStyle>
+</p:notesMaster>
+</file>
+
+<file path=ppt/notesSlides/notesSlide1.xml><?xml version="1.0" encoding="utf-8"?>
+<p:notes xmlns:a="http://schemas.openxmlformats.org/drawingml/2006/main" xmlns:r="http://schemas.openxmlformats.org/officeDocument/2006/relationships" xmlns:p="http://schemas.openxmlformats.org/presentationml/2006/main">
+  <p:cSld>
+    <p:spTree>
+      <p:nvGrpSpPr>
+        <p:cNvPr id="1" name=""/>
+        <p:cNvGrpSpPr/>
+        <p:nvPr/>
+      </p:nvGrpSpPr>
+      <p:grpSpPr>
+        <a:xfrm>
+          <a:off x="0" y="0"/>
+          <a:ext cx="0" cy="0"/>
+          <a:chOff x="0" y="0"/>
+          <a:chExt cx="0" cy="0"/>
+        </a:xfrm>
+      </p:grpSpPr>
+      <p:sp>
+        <p:nvSpPr>
+          <p:cNvPr id="2" name="Folienbildplatzhalter 1"/>
+          <p:cNvSpPr>
+            <a:spLocks noGrp="1" noRot="1" noChangeAspect="1"/>
+          </p:cNvSpPr>
+          <p:nvPr>
+            <p:ph type="sldImg"/>
+          </p:nvPr>
+        </p:nvSpPr>
+        <p:spPr/>
+      </p:sp>
+      <p:sp>
+        <p:nvSpPr>
+          <p:cNvPr id="3" name="Notizenplatzhalter 2"/>
+          <p:cNvSpPr>
+            <a:spLocks noGrp="1"/>
+          </p:cNvSpPr>
+          <p:nvPr>
+            <p:ph type="body" idx="1"/>
+          </p:nvPr>
+        </p:nvSpPr>
+        <p:spPr/>
+        <p:txBody>
+          <a:bodyPr/>
+          <a:lstStyle/>
+          <a:p>
+            <a:pPr marL="0" indent="0">
+              <a:buFontTx/>
+              <a:buNone/>
+            </a:pPr>
+            <a:r>
+              <a:rPr lang="de-DE" sz="1200" dirty="0" smtClean="0"/>
+              <a:t>Kategorienauswahl:</a:t>
+            </a:r>
+          </a:p>
+          <a:p>
+            <a:pPr marL="171450" indent="-171450">
+              <a:buFontTx/>
+              <a:buChar char="-"/>
+            </a:pPr>
+            <a:r>
+              <a:rPr lang="de-DE" sz="1200" dirty="0" smtClean="0"/>
+              <a:t>Die Kategorienauswahl steuert, welche Arten von Posts angezeigt werden sollen</a:t>
+            </a:r>
+          </a:p>
+          <a:p>
+            <a:pPr marL="171450" indent="-171450">
+              <a:buFontTx/>
+              <a:buChar char="-"/>
+            </a:pPr>
+            <a:r>
+              <a:rPr lang="de-DE" sz="1200" dirty="0" smtClean="0"/>
+              <a:t>Es werden nur die verfügbaren Optionen des aktuellen Zeitbereichs angegeben</a:t>
+            </a:r>
+          </a:p>
+          <a:p>
+            <a:pPr marL="171450" indent="-171450">
+              <a:buFontTx/>
+              <a:buChar char="-"/>
+            </a:pPr>
+            <a:r>
+              <a:rPr lang="de-DE" sz="2800" dirty="0" smtClean="0"/>
+              <a:t>Zusätzlich wird pro Kategorie die Anzahl der Tweets angezeigt</a:t>
+            </a:r>
+          </a:p>
+          <a:p>
+            <a:pPr marL="628650" lvl="1" indent="-171450">
+              <a:buFontTx/>
+              <a:buChar char="-"/>
+            </a:pPr>
+            <a:r>
+              <a:rPr lang="de-DE" sz="2000" dirty="0" smtClean="0"/>
+              <a:t>beschränkt sich auf die Posts mit Koordinaten</a:t>
+            </a:r>
+          </a:p>
+          <a:p>
+            <a:endParaRPr lang="de-DE" dirty="0" smtClean="0"/>
+          </a:p>
+          <a:p>
+            <a:pPr marL="171450" marR="0" indent="-171450" algn="l" defTabSz="914400" rtl="0" eaLnBrk="1" fontAlgn="auto" latinLnBrk="0" hangingPunct="1">
+              <a:lnSpc>
+                <a:spcPct val="100000"/>
+              </a:lnSpc>
+              <a:spcBef>
+                <a:spcPts val="0"/>
+              </a:spcBef>
+              <a:spcAft>
+                <a:spcPts val="0"/>
+              </a:spcAft>
+              <a:buClrTx/>
+              <a:buSzTx/>
+              <a:buFont typeface="Symbol"/>
+              <a:buChar char="Þ"/>
+              <a:tabLst/>
+              <a:defRPr/>
+            </a:pPr>
+            <a:r>
+              <a:rPr lang="de-DE" sz="1200" dirty="0" smtClean="0"/>
+              <a:t> Ermöglicht es dem Benutzer zudem, schnell die Art und Anzahl der Nachrichten wahrzunehmen</a:t>
+            </a:r>
+          </a:p>
+          <a:p>
+            <a:pPr marL="171450" marR="0" indent="-171450" algn="l" defTabSz="914400" rtl="0" eaLnBrk="1" fontAlgn="auto" latinLnBrk="0" hangingPunct="1">
+              <a:lnSpc>
+                <a:spcPct val="100000"/>
+              </a:lnSpc>
+              <a:spcBef>
+                <a:spcPts val="0"/>
+              </a:spcBef>
+              <a:spcAft>
+                <a:spcPts val="0"/>
+              </a:spcAft>
+              <a:buClrTx/>
+              <a:buSzTx/>
+              <a:buFont typeface="Symbol"/>
+              <a:buChar char="Þ"/>
+              <a:tabLst/>
+              <a:defRPr/>
+            </a:pPr>
+            <a:endParaRPr lang="de-DE" sz="1200" dirty="0" smtClean="0"/>
+          </a:p>
+          <a:p>
+            <a:pPr marL="0" marR="0" indent="0" algn="l" defTabSz="914400" rtl="0" eaLnBrk="1" fontAlgn="auto" latinLnBrk="0" hangingPunct="1">
+              <a:lnSpc>
+                <a:spcPct val="100000"/>
+              </a:lnSpc>
+              <a:spcBef>
+                <a:spcPts val="0"/>
+              </a:spcBef>
+              <a:spcAft>
+                <a:spcPts val="0"/>
+              </a:spcAft>
+              <a:buClrTx/>
+              <a:buSzTx/>
+              <a:buFont typeface="Symbol"/>
+              <a:buNone/>
+              <a:tabLst/>
+              <a:defRPr/>
+            </a:pPr>
+            <a:r>
+              <a:rPr lang="de-DE" sz="1200" dirty="0" smtClean="0"/>
+              <a:t>Zeitbereich:</a:t>
+            </a:r>
+          </a:p>
+          <a:p>
+            <a:pPr marL="0" indent="0">
+              <a:buFontTx/>
+              <a:buNone/>
+            </a:pPr>
+            <a:r>
+              <a:rPr lang="de-DE" sz="2800" dirty="0" smtClean="0"/>
+              <a:t>-   Mit dem Schieberegler kann ein Zeitintervall ausgewählt werden</a:t>
+            </a:r>
+          </a:p>
+          <a:p>
+            <a:pPr marL="0" indent="0">
+              <a:buFontTx/>
+              <a:buNone/>
+            </a:pPr>
+            <a:r>
+              <a:rPr lang="de-DE" sz="2000" dirty="0" smtClean="0"/>
+              <a:t>    </a:t>
+            </a:r>
+            <a:r>
+              <a:rPr lang="de-DE" sz="2000" baseline="0" dirty="0" smtClean="0"/>
+              <a:t>  </a:t>
+            </a:r>
+            <a:r>
+              <a:rPr lang="de-DE" sz="2000" dirty="0" smtClean="0"/>
+              <a:t>-   das Intervall reicht vom aktuellen Zeitpunkt bis X Minuten in die Vergangenheit</a:t>
+            </a:r>
+          </a:p>
+          <a:p>
+            <a:pPr marL="457200" lvl="1" indent="0">
+              <a:buNone/>
+            </a:pPr>
+            <a:endParaRPr lang="de-DE" sz="800" dirty="0" smtClean="0"/>
+          </a:p>
+          <a:p>
+            <a:r>
+              <a:rPr lang="de-DE" sz="2800" dirty="0" smtClean="0"/>
+              <a:t>-  Es werden nur die Posts angezeigt, die innerhalb des Intervalls gesendet wurden</a:t>
+            </a:r>
+            <a:endParaRPr lang="de-DE" sz="800" dirty="0" smtClean="0"/>
+          </a:p>
+          <a:p>
+            <a:r>
+              <a:rPr lang="de-DE" sz="2800" dirty="0" smtClean="0"/>
+              <a:t>-  Der Zeitbereich gilt für alle </a:t>
+            </a:r>
+            <a:r>
+              <a:rPr lang="de-DE" sz="2800" dirty="0" err="1" smtClean="0"/>
+              <a:t>Widgets</a:t>
+            </a:r>
+            <a:r>
+              <a:rPr lang="de-DE" sz="2800" dirty="0" smtClean="0"/>
+              <a:t>!</a:t>
+            </a:r>
+          </a:p>
+        </p:txBody>
+      </p:sp>
+      <p:sp>
+        <p:nvSpPr>
+          <p:cNvPr id="4" name="Foliennummernplatzhalter 3"/>
+          <p:cNvSpPr>
+            <a:spLocks noGrp="1"/>
+          </p:cNvSpPr>
+          <p:nvPr>
+            <p:ph type="sldNum" sz="quarter" idx="10"/>
+          </p:nvPr>
+        </p:nvSpPr>
+        <p:spPr/>
+        <p:txBody>
+          <a:bodyPr/>
+          <a:lstStyle/>
+          <a:p>
+            <a:fld id="{0673C40A-F867-4247-B469-DE0451605248}" type="slidenum">
+              <a:rPr lang="de-DE" smtClean="0"/>
+              <a:t>1</a:t>
+            </a:fld>
+            <a:endParaRPr lang="de-DE"/>
+          </a:p>
+        </p:txBody>
+      </p:sp>
+    </p:spTree>
+    <p:extLst>
+      <p:ext uri="{BB962C8B-B14F-4D97-AF65-F5344CB8AC3E}">
+        <p14:creationId xmlns:p14="http://schemas.microsoft.com/office/powerpoint/2010/main" val="2037934010"/>
+      </p:ext>
+    </p:extLst>
+  </p:cSld>
+  <p:clrMapOvr>
+    <a:masterClrMapping/>
+  </p:clrMapOvr>
+</p:notes>
+</file>
+
+<file path=ppt/notesSlides/notesSlide2.xml><?xml version="1.0" encoding="utf-8"?>
+<p:notes xmlns:a="http://schemas.openxmlformats.org/drawingml/2006/main" xmlns:r="http://schemas.openxmlformats.org/officeDocument/2006/relationships" xmlns:p="http://schemas.openxmlformats.org/presentationml/2006/main">
+  <p:cSld>
+    <p:spTree>
+      <p:nvGrpSpPr>
+        <p:cNvPr id="1" name=""/>
+        <p:cNvGrpSpPr/>
+        <p:nvPr/>
+      </p:nvGrpSpPr>
+      <p:grpSpPr>
+        <a:xfrm>
+          <a:off x="0" y="0"/>
+          <a:ext cx="0" cy="0"/>
+          <a:chOff x="0" y="0"/>
+          <a:chExt cx="0" cy="0"/>
+        </a:xfrm>
+      </p:grpSpPr>
+      <p:sp>
+        <p:nvSpPr>
+          <p:cNvPr id="2" name="Folienbildplatzhalter 1"/>
+          <p:cNvSpPr>
+            <a:spLocks noGrp="1" noRot="1" noChangeAspect="1"/>
+          </p:cNvSpPr>
+          <p:nvPr>
+            <p:ph type="sldImg"/>
+          </p:nvPr>
+        </p:nvSpPr>
+        <p:spPr/>
+      </p:sp>
+      <p:sp>
+        <p:nvSpPr>
+          <p:cNvPr id="3" name="Notizenplatzhalter 2"/>
+          <p:cNvSpPr>
+            <a:spLocks noGrp="1"/>
+          </p:cNvSpPr>
+          <p:nvPr>
+            <p:ph type="body" idx="1"/>
+          </p:nvPr>
+        </p:nvSpPr>
+        <p:spPr/>
+        <p:txBody>
+          <a:bodyPr/>
+          <a:lstStyle/>
+          <a:p>
+            <a:pPr marL="0" marR="0" indent="0" algn="l" defTabSz="914400" rtl="0" eaLnBrk="1" fontAlgn="auto" latinLnBrk="0" hangingPunct="1">
+              <a:lnSpc>
+                <a:spcPct val="100000"/>
+              </a:lnSpc>
+              <a:spcBef>
+                <a:spcPts val="0"/>
+              </a:spcBef>
+              <a:spcAft>
+                <a:spcPts val="0"/>
+              </a:spcAft>
+              <a:buClrTx/>
+              <a:buSzTx/>
+              <a:buFontTx/>
+              <a:buNone/>
+              <a:tabLst/>
+              <a:defRPr/>
+            </a:pPr>
+            <a:r>
+              <a:rPr lang="de-DE" sz="1200" dirty="0" smtClean="0"/>
+              <a:t>Per Klick auf eine Markierung wird ein Pop-Up eingeblendet:</a:t>
+            </a:r>
+          </a:p>
+          <a:p>
+            <a:endParaRPr lang="de-DE" sz="2400" dirty="0" smtClean="0"/>
+          </a:p>
+          <a:p>
+            <a:r>
+              <a:rPr lang="de-DE" sz="2400" dirty="0" smtClean="0"/>
+              <a:t>Dies zeigt die Daten des Tweets an:</a:t>
+            </a:r>
+            <a:endParaRPr lang="de-DE" sz="800" dirty="0" smtClean="0"/>
+          </a:p>
+          <a:p>
+            <a:pPr marL="531813" lvl="1" indent="-258763">
+              <a:buFont typeface="Symbol" panose="05050102010706020507" pitchFamily="18" charset="2"/>
+              <a:buChar char="-"/>
+            </a:pPr>
+            <a:r>
+              <a:rPr lang="de-DE" sz="2400" dirty="0" smtClean="0"/>
+              <a:t>ermittelte Kategorie</a:t>
+            </a:r>
+          </a:p>
+          <a:p>
+            <a:pPr marL="531813" lvl="1" indent="-258763">
+              <a:buFont typeface="Symbol" panose="05050102010706020507" pitchFamily="18" charset="2"/>
+              <a:buChar char="-"/>
+            </a:pPr>
+            <a:r>
+              <a:rPr lang="de-DE" sz="2400" dirty="0" smtClean="0"/>
+              <a:t>Sendezeit</a:t>
+            </a:r>
+          </a:p>
+          <a:p>
+            <a:pPr marL="531813" lvl="1" indent="-258763">
+              <a:buFont typeface="Symbol" panose="05050102010706020507" pitchFamily="18" charset="2"/>
+              <a:buChar char="-"/>
+            </a:pPr>
+            <a:r>
+              <a:rPr lang="de-DE" sz="2400" dirty="0" smtClean="0"/>
+              <a:t>Absender</a:t>
+            </a:r>
+          </a:p>
+          <a:p>
+            <a:pPr marL="531813" lvl="1" indent="-258763">
+              <a:buFont typeface="Symbol" panose="05050102010706020507" pitchFamily="18" charset="2"/>
+              <a:buChar char="-"/>
+            </a:pPr>
+            <a:r>
+              <a:rPr lang="de-DE" sz="2400" dirty="0" smtClean="0"/>
+              <a:t>Nachrichtentext</a:t>
+            </a:r>
+          </a:p>
+          <a:p>
+            <a:pPr marL="531813" lvl="1" indent="-258763">
+              <a:buFont typeface="Symbol" panose="05050102010706020507" pitchFamily="18" charset="2"/>
+              <a:buChar char="-"/>
+            </a:pPr>
+            <a:r>
+              <a:rPr lang="de-DE" sz="2400" dirty="0" smtClean="0"/>
+              <a:t>Koordinaten</a:t>
+            </a:r>
+          </a:p>
+          <a:p>
+            <a:pPr marL="342900" indent="-247650">
+              <a:buFont typeface="Symbol" panose="05050102010706020507" pitchFamily="18" charset="2"/>
+              <a:buChar char="-"/>
+            </a:pPr>
+            <a:endParaRPr lang="de-DE" sz="2400" dirty="0" smtClean="0"/>
+          </a:p>
+          <a:p>
+            <a:pPr marL="438150" indent="-342900">
+              <a:buFont typeface="Wingdings" panose="05000000000000000000" pitchFamily="2" charset="2"/>
+              <a:buChar char="ü"/>
+            </a:pPr>
+            <a:r>
+              <a:rPr lang="de-DE" sz="2400" dirty="0" smtClean="0"/>
+              <a:t>Alle wichtigen Informationen auf einen Blick</a:t>
+            </a:r>
+          </a:p>
+        </p:txBody>
+      </p:sp>
+      <p:sp>
+        <p:nvSpPr>
+          <p:cNvPr id="4" name="Foliennummernplatzhalter 3"/>
+          <p:cNvSpPr>
+            <a:spLocks noGrp="1"/>
+          </p:cNvSpPr>
+          <p:nvPr>
+            <p:ph type="sldNum" sz="quarter" idx="10"/>
+          </p:nvPr>
+        </p:nvSpPr>
+        <p:spPr/>
+        <p:txBody>
+          <a:bodyPr/>
+          <a:lstStyle/>
+          <a:p>
+            <a:fld id="{0673C40A-F867-4247-B469-DE0451605248}" type="slidenum">
+              <a:rPr lang="de-DE" smtClean="0"/>
+              <a:t>2</a:t>
+            </a:fld>
+            <a:endParaRPr lang="de-DE"/>
+          </a:p>
+        </p:txBody>
+      </p:sp>
+    </p:spTree>
+    <p:extLst>
+      <p:ext uri="{BB962C8B-B14F-4D97-AF65-F5344CB8AC3E}">
+        <p14:creationId xmlns:p14="http://schemas.microsoft.com/office/powerpoint/2010/main" val="293893961"/>
+      </p:ext>
+    </p:extLst>
+  </p:cSld>
+  <p:clrMapOvr>
+    <a:masterClrMapping/>
+  </p:clrMapOvr>
+</p:notes>
+</file>
+
+<file path=ppt/notesSlides/notesSlide3.xml><?xml version="1.0" encoding="utf-8"?>
+<p:notes xmlns:a="http://schemas.openxmlformats.org/drawingml/2006/main" xmlns:r="http://schemas.openxmlformats.org/officeDocument/2006/relationships" xmlns:p="http://schemas.openxmlformats.org/presentationml/2006/main">
+  <p:cSld>
+    <p:spTree>
+      <p:nvGrpSpPr>
+        <p:cNvPr id="1" name=""/>
+        <p:cNvGrpSpPr/>
+        <p:nvPr/>
+      </p:nvGrpSpPr>
+      <p:grpSpPr>
+        <a:xfrm>
+          <a:off x="0" y="0"/>
+          <a:ext cx="0" cy="0"/>
+          <a:chOff x="0" y="0"/>
+          <a:chExt cx="0" cy="0"/>
+        </a:xfrm>
+      </p:grpSpPr>
+      <p:sp>
+        <p:nvSpPr>
+          <p:cNvPr id="2" name="Folienbildplatzhalter 1"/>
+          <p:cNvSpPr>
+            <a:spLocks noGrp="1" noRot="1" noChangeAspect="1"/>
+          </p:cNvSpPr>
+          <p:nvPr>
+            <p:ph type="sldImg"/>
+          </p:nvPr>
+        </p:nvSpPr>
+        <p:spPr/>
+      </p:sp>
+      <p:sp>
+        <p:nvSpPr>
+          <p:cNvPr id="3" name="Notizenplatzhalter 2"/>
+          <p:cNvSpPr>
+            <a:spLocks noGrp="1"/>
+          </p:cNvSpPr>
+          <p:nvPr>
+            <p:ph type="body" idx="1"/>
+          </p:nvPr>
+        </p:nvSpPr>
+        <p:spPr/>
+        <p:txBody>
+          <a:bodyPr/>
+          <a:lstStyle/>
+          <a:p>
+            <a:endParaRPr lang="de-DE"/>
+          </a:p>
+        </p:txBody>
+      </p:sp>
+      <p:sp>
+        <p:nvSpPr>
+          <p:cNvPr id="4" name="Foliennummernplatzhalter 3"/>
+          <p:cNvSpPr>
+            <a:spLocks noGrp="1"/>
+          </p:cNvSpPr>
+          <p:nvPr>
+            <p:ph type="sldNum" sz="quarter" idx="10"/>
+          </p:nvPr>
+        </p:nvSpPr>
+        <p:spPr/>
+        <p:txBody>
+          <a:bodyPr/>
+          <a:lstStyle/>
+          <a:p>
+            <a:fld id="{0673C40A-F867-4247-B469-DE0451605248}" type="slidenum">
+              <a:rPr lang="de-DE" smtClean="0"/>
+              <a:t>3</a:t>
+            </a:fld>
+            <a:endParaRPr lang="de-DE"/>
+          </a:p>
+        </p:txBody>
+      </p:sp>
+    </p:spTree>
+    <p:extLst>
+      <p:ext uri="{BB962C8B-B14F-4D97-AF65-F5344CB8AC3E}">
+        <p14:creationId xmlns:p14="http://schemas.microsoft.com/office/powerpoint/2010/main" val="265159153"/>
+      </p:ext>
+    </p:extLst>
+  </p:cSld>
+  <p:clrMapOvr>
+    <a:masterClrMapping/>
+  </p:clrMapOvr>
+</p:notes>
 </file>
 
 <file path=ppt/slideLayouts/slideLayout1.xml><?xml version="1.0" encoding="utf-8"?>
@@ -3076,7 +3945,7 @@
         </p:nvSpPr>
         <p:spPr>
           <a:xfrm>
-            <a:off x="3419872" y="1844824"/>
+            <a:off x="3707904" y="1844824"/>
             <a:ext cx="5266928" cy="4277072"/>
           </a:xfrm>
         </p:spPr>
@@ -3089,23 +3958,49 @@
             <a:pPr marL="450850" indent="-450850"/>
             <a:r>
               <a:rPr lang="de-DE" sz="2800" dirty="0" smtClean="0"/>
-              <a:t>Kategorienauswahl </a:t>
+              <a:t>Anzeigeeinstellungen sind </a:t>
+            </a:r>
+            <a:r>
+              <a:rPr lang="de-DE" sz="2800" dirty="0" smtClean="0"/>
+              <a:t>als </a:t>
             </a:r>
             <a:r>
               <a:rPr lang="de-DE" sz="2800" dirty="0"/>
-              <a:t>und Zeitbereich sind als ein </a:t>
-            </a:r>
-            <a:r>
-              <a:rPr lang="de-DE" sz="2800" i="1" dirty="0" smtClean="0"/>
+              <a:t>ein </a:t>
+            </a:r>
+            <a:r>
+              <a:rPr lang="de-DE" sz="2800" i="1" dirty="0" err="1" smtClean="0"/>
               <a:t>Widget</a:t>
             </a:r>
             <a:r>
               <a:rPr lang="de-DE" sz="2800" dirty="0" smtClean="0"/>
-              <a:t> zusammengefasst</a:t>
-            </a:r>
-          </a:p>
-          <a:p>
-            <a:endParaRPr lang="de-DE" sz="2800" dirty="0"/>
+              <a:t> </a:t>
+            </a:r>
+            <a:r>
+              <a:rPr lang="de-DE" sz="2800" dirty="0" smtClean="0"/>
+              <a:t>zusammengefasst</a:t>
+            </a:r>
+          </a:p>
+          <a:p>
+            <a:pPr marL="850900" lvl="1" indent="-450850"/>
+            <a:r>
+              <a:rPr lang="de-DE" sz="2400" dirty="0" smtClean="0"/>
+              <a:t>Kategorien</a:t>
+            </a:r>
+          </a:p>
+          <a:p>
+            <a:pPr marL="850900" lvl="1" indent="-450850"/>
+            <a:r>
+              <a:rPr lang="de-DE" sz="2400" dirty="0" smtClean="0"/>
+              <a:t>Zeitbereich</a:t>
+            </a:r>
+            <a:endParaRPr lang="de-DE" sz="2400" dirty="0" smtClean="0"/>
+          </a:p>
+          <a:p>
+            <a:pPr marL="0" indent="0">
+              <a:buNone/>
+            </a:pPr>
+            <a:endParaRPr lang="de-DE" sz="800" dirty="0"/>
           </a:p>
           <a:p>
             <a:pPr marL="450850" indent="-450850">
@@ -3133,7 +4028,7 @@
           <p:nvPr/>
         </p:nvPicPr>
         <p:blipFill>
-          <a:blip r:embed="rId2">
+          <a:blip r:embed="rId3">
             <a:extLst>
               <a:ext uri="{28A0092B-C50C-407E-A947-70E740481C1C}">
                 <a14:useLocalDpi xmlns:a14="http://schemas.microsoft.com/office/drawing/2010/main" val="0"/>
@@ -3147,7 +4042,7 @@
         <p:spPr bwMode="auto">
           <a:xfrm>
             <a:off x="96686" y="1916832"/>
-            <a:ext cx="3395194" cy="3430683"/>
+            <a:ext cx="3705682" cy="3744416"/>
           </a:xfrm>
           <a:prstGeom prst="rect">
             <a:avLst/>
@@ -3218,7 +4113,7 @@
           <a:p>
             <a:r>
               <a:rPr lang="de-DE" dirty="0" smtClean="0"/>
-              <a:t>Kategorienauswahl</a:t>
+              <a:t>Kartenansicht</a:t>
             </a:r>
             <a:endParaRPr lang="de-DE" dirty="0"/>
           </a:p>
@@ -3236,246 +4131,57 @@
         </p:nvSpPr>
         <p:spPr>
           <a:xfrm>
-            <a:off x="393896" y="1670075"/>
-            <a:ext cx="7994528" cy="1974949"/>
+            <a:off x="395536" y="1600201"/>
+            <a:ext cx="8229600" cy="1396751"/>
           </a:xfrm>
         </p:spPr>
         <p:txBody>
           <a:bodyPr>
-            <a:normAutofit lnSpcReduction="10000"/>
-          </a:bodyPr>
-          <a:lstStyle/>
-          <a:p>
-            <a:r>
-              <a:rPr lang="de-DE" sz="2800" dirty="0"/>
-              <a:t>die </a:t>
-            </a:r>
-            <a:r>
-              <a:rPr lang="de-DE" sz="2800" dirty="0" smtClean="0"/>
-              <a:t>Kategorienauswahl </a:t>
-            </a:r>
-            <a:r>
-              <a:rPr lang="de-DE" sz="2800" dirty="0"/>
-              <a:t>steuert, welche Arten von Posts angezeigt werden </a:t>
-            </a:r>
-            <a:r>
-              <a:rPr lang="de-DE" sz="2800" dirty="0" smtClean="0"/>
-              <a:t>sollen</a:t>
-            </a:r>
-          </a:p>
-          <a:p>
-            <a:pPr marL="0" indent="0">
-              <a:buNone/>
-            </a:pPr>
-            <a:endParaRPr lang="de-DE" sz="900" dirty="0" smtClean="0"/>
-          </a:p>
-          <a:p>
-            <a:r>
-              <a:rPr lang="de-DE" sz="2800" dirty="0"/>
-              <a:t>es werden nur die verfügbaren Optionen des aktuellen Zeitbereichs </a:t>
-            </a:r>
-            <a:r>
-              <a:rPr lang="de-DE" sz="2800" dirty="0" smtClean="0"/>
-              <a:t>angegeben</a:t>
-            </a:r>
-            <a:endParaRPr lang="de-DE" sz="2800" dirty="0"/>
-          </a:p>
-        </p:txBody>
-      </p:sp>
-      <p:sp>
-        <p:nvSpPr>
-          <p:cNvPr id="5" name="Inhaltsplatzhalter 2"/>
-          <p:cNvSpPr txBox="1">
-            <a:spLocks/>
-          </p:cNvSpPr>
-          <p:nvPr/>
-        </p:nvSpPr>
-        <p:spPr>
-          <a:xfrm>
-            <a:off x="395536" y="3645024"/>
-            <a:ext cx="5688631" cy="1368152"/>
-          </a:xfrm>
-          <a:prstGeom prst="rect">
-            <a:avLst/>
-          </a:prstGeom>
-        </p:spPr>
-        <p:txBody>
-          <a:bodyPr vert="horz" lIns="91440" tIns="45720" rIns="91440" bIns="45720" rtlCol="0">
             <a:normAutofit/>
           </a:bodyPr>
-          <a:lstStyle>
-            <a:lvl1pPr marL="342900" indent="-342900" algn="l" defTabSz="914400" rtl="0" eaLnBrk="1" latinLnBrk="0" hangingPunct="1">
-              <a:spcBef>
-                <a:spcPct val="20000"/>
-              </a:spcBef>
-              <a:buFont typeface="Arial" pitchFamily="34" charset="0"/>
-              <a:buChar char="•"/>
-              <a:defRPr sz="3200" kern="1200">
-                <a:solidFill>
-                  <a:schemeClr val="tx1"/>
-                </a:solidFill>
-                <a:latin typeface="+mn-lt"/>
-                <a:ea typeface="+mn-ea"/>
-                <a:cs typeface="+mn-cs"/>
-              </a:defRPr>
-            </a:lvl1pPr>
-            <a:lvl2pPr marL="742950" indent="-285750" algn="l" defTabSz="914400" rtl="0" eaLnBrk="1" latinLnBrk="0" hangingPunct="1">
-              <a:spcBef>
-                <a:spcPct val="20000"/>
-              </a:spcBef>
-              <a:buFont typeface="Arial" pitchFamily="34" charset="0"/>
-              <a:buChar char="–"/>
-              <a:defRPr sz="2800" kern="1200">
-                <a:solidFill>
-                  <a:schemeClr val="tx1"/>
-                </a:solidFill>
-                <a:latin typeface="+mn-lt"/>
-                <a:ea typeface="+mn-ea"/>
-                <a:cs typeface="+mn-cs"/>
-              </a:defRPr>
-            </a:lvl2pPr>
-            <a:lvl3pPr marL="1143000" indent="-228600" algn="l" defTabSz="914400" rtl="0" eaLnBrk="1" latinLnBrk="0" hangingPunct="1">
-              <a:spcBef>
-                <a:spcPct val="20000"/>
-              </a:spcBef>
-              <a:buFont typeface="Arial" pitchFamily="34" charset="0"/>
-              <a:buChar char="•"/>
-              <a:defRPr sz="2400" kern="1200">
-                <a:solidFill>
-                  <a:schemeClr val="tx1"/>
-                </a:solidFill>
-                <a:latin typeface="+mn-lt"/>
-                <a:ea typeface="+mn-ea"/>
-                <a:cs typeface="+mn-cs"/>
-              </a:defRPr>
-            </a:lvl3pPr>
-            <a:lvl4pPr marL="1600200" indent="-228600" algn="l" defTabSz="914400" rtl="0" eaLnBrk="1" latinLnBrk="0" hangingPunct="1">
-              <a:spcBef>
-                <a:spcPct val="20000"/>
-              </a:spcBef>
-              <a:buFont typeface="Arial" pitchFamily="34" charset="0"/>
-              <a:buChar char="–"/>
-              <a:defRPr sz="2000" kern="1200">
-                <a:solidFill>
-                  <a:schemeClr val="tx1"/>
-                </a:solidFill>
-                <a:latin typeface="+mn-lt"/>
-                <a:ea typeface="+mn-ea"/>
-                <a:cs typeface="+mn-cs"/>
-              </a:defRPr>
-            </a:lvl4pPr>
-            <a:lvl5pPr marL="2057400" indent="-228600" algn="l" defTabSz="914400" rtl="0" eaLnBrk="1" latinLnBrk="0" hangingPunct="1">
-              <a:spcBef>
-                <a:spcPct val="20000"/>
-              </a:spcBef>
-              <a:buFont typeface="Arial" pitchFamily="34" charset="0"/>
-              <a:buChar char="»"/>
-              <a:defRPr sz="2000" kern="1200">
-                <a:solidFill>
-                  <a:schemeClr val="tx1"/>
-                </a:solidFill>
-                <a:latin typeface="+mn-lt"/>
-                <a:ea typeface="+mn-ea"/>
-                <a:cs typeface="+mn-cs"/>
-              </a:defRPr>
-            </a:lvl5pPr>
-            <a:lvl6pPr marL="2514600" indent="-228600" algn="l" defTabSz="914400" rtl="0" eaLnBrk="1" latinLnBrk="0" hangingPunct="1">
-              <a:spcBef>
-                <a:spcPct val="20000"/>
-              </a:spcBef>
-              <a:buFont typeface="Arial" pitchFamily="34" charset="0"/>
-              <a:buChar char="•"/>
-              <a:defRPr sz="2000" kern="1200">
-                <a:solidFill>
-                  <a:schemeClr val="tx1"/>
-                </a:solidFill>
-                <a:latin typeface="+mn-lt"/>
-                <a:ea typeface="+mn-ea"/>
-                <a:cs typeface="+mn-cs"/>
-              </a:defRPr>
-            </a:lvl6pPr>
-            <a:lvl7pPr marL="2971800" indent="-228600" algn="l" defTabSz="914400" rtl="0" eaLnBrk="1" latinLnBrk="0" hangingPunct="1">
-              <a:spcBef>
-                <a:spcPct val="20000"/>
-              </a:spcBef>
-              <a:buFont typeface="Arial" pitchFamily="34" charset="0"/>
-              <a:buChar char="•"/>
-              <a:defRPr sz="2000" kern="1200">
-                <a:solidFill>
-                  <a:schemeClr val="tx1"/>
-                </a:solidFill>
-                <a:latin typeface="+mn-lt"/>
-                <a:ea typeface="+mn-ea"/>
-                <a:cs typeface="+mn-cs"/>
-              </a:defRPr>
-            </a:lvl7pPr>
-            <a:lvl8pPr marL="3429000" indent="-228600" algn="l" defTabSz="914400" rtl="0" eaLnBrk="1" latinLnBrk="0" hangingPunct="1">
-              <a:spcBef>
-                <a:spcPct val="20000"/>
-              </a:spcBef>
-              <a:buFont typeface="Arial" pitchFamily="34" charset="0"/>
-              <a:buChar char="•"/>
-              <a:defRPr sz="2000" kern="1200">
-                <a:solidFill>
-                  <a:schemeClr val="tx1"/>
-                </a:solidFill>
-                <a:latin typeface="+mn-lt"/>
-                <a:ea typeface="+mn-ea"/>
-                <a:cs typeface="+mn-cs"/>
-              </a:defRPr>
-            </a:lvl8pPr>
-            <a:lvl9pPr marL="3886200" indent="-228600" algn="l" defTabSz="914400" rtl="0" eaLnBrk="1" latinLnBrk="0" hangingPunct="1">
-              <a:spcBef>
-                <a:spcPct val="20000"/>
-              </a:spcBef>
-              <a:buFont typeface="Arial" pitchFamily="34" charset="0"/>
-              <a:buChar char="•"/>
-              <a:defRPr sz="2000" kern="1200">
-                <a:solidFill>
-                  <a:schemeClr val="tx1"/>
-                </a:solidFill>
-                <a:latin typeface="+mn-lt"/>
-                <a:ea typeface="+mn-ea"/>
-                <a:cs typeface="+mn-cs"/>
-              </a:defRPr>
-            </a:lvl9pPr>
-          </a:lstStyle>
+          <a:lstStyle/>
           <a:p>
             <a:r>
               <a:rPr lang="de-DE" sz="2800" dirty="0"/>
-              <a:t>z</a:t>
+              <a:t>visualisiert </a:t>
             </a:r>
             <a:r>
               <a:rPr lang="de-DE" sz="2800" dirty="0" smtClean="0"/>
-              <a:t>usätzlich </a:t>
+              <a:t>Position und Kategorie </a:t>
+            </a:r>
+            <a:r>
+              <a:rPr lang="de-DE" sz="2800" dirty="0"/>
+              <a:t>der </a:t>
             </a:r>
             <a:r>
               <a:rPr lang="de-DE" sz="2800" dirty="0" smtClean="0"/>
-              <a:t>wird pro Kategorie die Anzahl der Tweets angezeigt</a:t>
-            </a:r>
-          </a:p>
-          <a:p>
-            <a:pPr lvl="1"/>
-            <a:r>
-              <a:rPr lang="de-DE" sz="2000" dirty="0" smtClean="0"/>
-              <a:t>beschränkt sich auf die Posts mit Koordinaten</a:t>
-            </a:r>
-          </a:p>
-          <a:p>
-            <a:endParaRPr lang="de-DE" sz="800" dirty="0" smtClean="0"/>
+              <a:t>Tweets</a:t>
+            </a:r>
+            <a:endParaRPr lang="de-DE" sz="900" dirty="0" smtClean="0"/>
+          </a:p>
+          <a:p>
+            <a:r>
+              <a:rPr lang="de-DE" sz="2800" dirty="0"/>
+              <a:t>Kartenausschnitt ist frei beweglich und </a:t>
+            </a:r>
+            <a:r>
+              <a:rPr lang="de-DE" sz="2800" dirty="0" err="1" smtClean="0"/>
+              <a:t>zoombar</a:t>
+            </a:r>
+            <a:endParaRPr lang="de-DE" sz="2800" dirty="0" smtClean="0"/>
           </a:p>
         </p:txBody>
       </p:sp>
       <p:pic>
         <p:nvPicPr>
-          <p:cNvPr id="2051" name="Picture 3"/>
+          <p:cNvPr id="4099" name="Picture 3" descr="C:\Users\JediForces\Desktop\03-map.png"/>
           <p:cNvPicPr>
             <a:picLocks noChangeAspect="1" noChangeArrowheads="1"/>
           </p:cNvPicPr>
           <p:nvPr/>
         </p:nvPicPr>
         <p:blipFill>
-          <a:blip r:embed="rId2">
+          <a:blip r:embed="rId3">
             <a:extLst>
               <a:ext uri="{28A0092B-C50C-407E-A947-70E740481C1C}">
                 <a14:useLocalDpi xmlns:a14="http://schemas.microsoft.com/office/drawing/2010/main" val="0"/>
@@ -3489,47 +4195,34 @@
         </p:blipFill>
         <p:spPr bwMode="auto">
           <a:xfrm>
-            <a:off x="6012160" y="3212976"/>
-            <a:ext cx="3032066" cy="2088232"/>
+            <a:off x="2771800" y="2740268"/>
+            <a:ext cx="6372200" cy="4121269"/>
           </a:xfrm>
           <a:prstGeom prst="rect">
             <a:avLst/>
           </a:prstGeom>
           <a:noFill/>
-          <a:ln>
-            <a:noFill/>
-          </a:ln>
           <a:extLst>
             <a:ext uri="{909E8E84-426E-40DD-AFC4-6F175D3DCCD1}">
               <a14:hiddenFill xmlns:a14="http://schemas.microsoft.com/office/drawing/2010/main">
                 <a:solidFill>
-                  <a:schemeClr val="accent1"/>
+                  <a:srgbClr val="FFFFFF"/>
                 </a:solidFill>
               </a14:hiddenFill>
-            </a:ext>
-            <a:ext uri="{91240B29-F687-4F45-9708-019B960494DF}">
-              <a14:hiddenLine xmlns:a14="http://schemas.microsoft.com/office/drawing/2010/main" w="9525">
-                <a:solidFill>
-                  <a:schemeClr val="tx1"/>
-                </a:solidFill>
-                <a:miter lim="800000"/>
-                <a:headEnd/>
-                <a:tailEnd/>
-              </a14:hiddenLine>
             </a:ext>
           </a:extLst>
         </p:spPr>
       </p:pic>
       <p:sp>
         <p:nvSpPr>
-          <p:cNvPr id="4" name="Textfeld 3"/>
+          <p:cNvPr id="5" name="Textfeld 4"/>
           <p:cNvSpPr txBox="1"/>
           <p:nvPr/>
         </p:nvSpPr>
         <p:spPr>
           <a:xfrm>
-            <a:off x="395536" y="5438254"/>
-            <a:ext cx="8280920" cy="1231106"/>
+            <a:off x="323528" y="3258739"/>
+            <a:ext cx="2664296" cy="2246769"/>
           </a:xfrm>
           <a:prstGeom prst="rect">
             <a:avLst/>
@@ -3548,15 +4241,9 @@
             </a:pPr>
             <a:r>
               <a:rPr lang="de-DE" sz="2800" dirty="0" smtClean="0"/>
-              <a:t>Ermöglicht es dem Benutzer zudem, </a:t>
-            </a:r>
-            <a:r>
-              <a:rPr lang="de-DE" sz="2800" dirty="0"/>
-              <a:t>schnell die Art und Anzahl der Nachrichten wahrzunehmen</a:t>
-            </a:r>
-          </a:p>
-          <a:p>
-            <a:endParaRPr lang="de-DE" dirty="0"/>
+              <a:t>Fasst alle Informationen eines Tweets ortsbezogen zusammen</a:t>
+            </a:r>
+            <a:endParaRPr lang="de-DE" sz="2800" dirty="0"/>
           </a:p>
         </p:txBody>
       </p:sp>
@@ -3614,1289 +4301,6 @@
           <a:p>
             <a:r>
               <a:rPr lang="de-DE" dirty="0" smtClean="0"/>
-              <a:t>Kategorienauswahl</a:t>
-            </a:r>
-            <a:endParaRPr lang="de-DE" dirty="0"/>
-          </a:p>
-        </p:txBody>
-      </p:sp>
-      <p:sp>
-        <p:nvSpPr>
-          <p:cNvPr id="3" name="Inhaltsplatzhalter 2"/>
-          <p:cNvSpPr>
-            <a:spLocks noGrp="1"/>
-          </p:cNvSpPr>
-          <p:nvPr>
-            <p:ph idx="1"/>
-          </p:nvPr>
-        </p:nvSpPr>
-        <p:spPr>
-          <a:xfrm>
-            <a:off x="393896" y="1670075"/>
-            <a:ext cx="7994528" cy="1974949"/>
-          </a:xfrm>
-        </p:spPr>
-        <p:txBody>
-          <a:bodyPr>
-            <a:normAutofit/>
-          </a:bodyPr>
-          <a:lstStyle/>
-          <a:p>
-            <a:pPr marL="0" indent="0">
-              <a:buNone/>
-            </a:pPr>
-            <a:r>
-              <a:rPr lang="de-DE" sz="2800" dirty="0" smtClean="0"/>
-              <a:t>Folgende Kategorisierung wird vorgenommen:</a:t>
-            </a:r>
-            <a:endParaRPr lang="de-DE" sz="2800" dirty="0"/>
-          </a:p>
-        </p:txBody>
-      </p:sp>
-      <p:graphicFrame>
-        <p:nvGraphicFramePr>
-          <p:cNvPr id="4" name="Tabelle 3"/>
-          <p:cNvGraphicFramePr>
-            <a:graphicFrameLocks noGrp="1"/>
-          </p:cNvGraphicFramePr>
-          <p:nvPr>
-            <p:extLst>
-              <p:ext uri="{D42A27DB-BD31-4B8C-83A1-F6EECF244321}">
-                <p14:modId xmlns:p14="http://schemas.microsoft.com/office/powerpoint/2010/main" val="1894473067"/>
-              </p:ext>
-            </p:extLst>
-          </p:nvPr>
-        </p:nvGraphicFramePr>
-        <p:xfrm>
-          <a:off x="899592" y="2492896"/>
-          <a:ext cx="6480719" cy="3952448"/>
-        </p:xfrm>
-        <a:graphic>
-          <a:graphicData uri="http://schemas.openxmlformats.org/drawingml/2006/table">
-            <a:tbl>
-              <a:tblPr firstRow="1" bandRow="1">
-                <a:tableStyleId>{5C22544A-7EE6-4342-B048-85BDC9FD1C3A}</a:tableStyleId>
-              </a:tblPr>
-              <a:tblGrid>
-                <a:gridCol w="2296573"/>
-                <a:gridCol w="2960011"/>
-                <a:gridCol w="1224135"/>
-              </a:tblGrid>
-              <a:tr h="432048">
-                <a:tc>
-                  <a:txBody>
-                    <a:bodyPr/>
-                    <a:lstStyle/>
-                    <a:p>
-                      <a:r>
-                        <a:rPr lang="de-DE" dirty="0" smtClean="0"/>
-                        <a:t>Bezeichner</a:t>
-                      </a:r>
-                      <a:endParaRPr lang="de-DE" dirty="0"/>
-                    </a:p>
-                  </a:txBody>
-                  <a:tcPr/>
-                </a:tc>
-                <a:tc>
-                  <a:txBody>
-                    <a:bodyPr/>
-                    <a:lstStyle/>
-                    <a:p>
-                      <a:r>
-                        <a:rPr lang="de-DE" dirty="0" smtClean="0"/>
-                        <a:t>Bedeutung</a:t>
-                      </a:r>
-                      <a:endParaRPr lang="de-DE" dirty="0"/>
-                    </a:p>
-                  </a:txBody>
-                  <a:tcPr/>
-                </a:tc>
-                <a:tc>
-                  <a:txBody>
-                    <a:bodyPr/>
-                    <a:lstStyle/>
-                    <a:p>
-                      <a:r>
-                        <a:rPr lang="de-DE" dirty="0" smtClean="0"/>
-                        <a:t>Symbol</a:t>
-                      </a:r>
-                      <a:endParaRPr lang="de-DE" dirty="0"/>
-                    </a:p>
-                  </a:txBody>
-                  <a:tcPr/>
-                </a:tc>
-              </a:tr>
-              <a:tr h="432048">
-                <a:tc>
-                  <a:txBody>
-                    <a:bodyPr/>
-                    <a:lstStyle/>
-                    <a:p>
-                      <a:pPr algn="l"/>
-                      <a:r>
-                        <a:rPr lang="de-DE" i="1" dirty="0" smtClean="0"/>
-                        <a:t>Help Request</a:t>
-                      </a:r>
-                      <a:endParaRPr lang="de-DE" i="1" dirty="0"/>
-                    </a:p>
-                  </a:txBody>
-                  <a:tcPr anchor="ctr"/>
-                </a:tc>
-                <a:tc>
-                  <a:txBody>
-                    <a:bodyPr/>
-                    <a:lstStyle/>
-                    <a:p>
-                      <a:pPr algn="l"/>
-                      <a:r>
-                        <a:rPr lang="de-DE" dirty="0" smtClean="0"/>
-                        <a:t>Notrufe / kritische Information</a:t>
-                      </a:r>
-                      <a:endParaRPr lang="de-DE" dirty="0"/>
-                    </a:p>
-                  </a:txBody>
-                  <a:tcPr anchor="ctr"/>
-                </a:tc>
-                <a:tc>
-                  <a:txBody>
-                    <a:bodyPr/>
-                    <a:lstStyle/>
-                    <a:p>
-                      <a:endParaRPr lang="de-DE"/>
-                    </a:p>
-                  </a:txBody>
-                  <a:tcPr/>
-                </a:tc>
-              </a:tr>
-              <a:tr h="584056">
-                <a:tc>
-                  <a:txBody>
-                    <a:bodyPr/>
-                    <a:lstStyle/>
-                    <a:p>
-                      <a:pPr algn="l"/>
-                      <a:r>
-                        <a:rPr lang="de-DE" i="1" dirty="0" smtClean="0"/>
-                        <a:t>Information Request</a:t>
-                      </a:r>
-                      <a:endParaRPr lang="de-DE" i="1" dirty="0"/>
-                    </a:p>
-                  </a:txBody>
-                  <a:tcPr anchor="ctr"/>
-                </a:tc>
-                <a:tc>
-                  <a:txBody>
-                    <a:bodyPr/>
-                    <a:lstStyle/>
-                    <a:p>
-                      <a:pPr algn="l"/>
-                      <a:r>
-                        <a:rPr lang="de-DE" dirty="0" smtClean="0"/>
-                        <a:t>Informationsanfrage</a:t>
-                      </a:r>
-                      <a:endParaRPr lang="de-DE" dirty="0"/>
-                    </a:p>
-                  </a:txBody>
-                  <a:tcPr anchor="ctr"/>
-                </a:tc>
-                <a:tc>
-                  <a:txBody>
-                    <a:bodyPr/>
-                    <a:lstStyle/>
-                    <a:p>
-                      <a:endParaRPr lang="de-DE"/>
-                    </a:p>
-                  </a:txBody>
-                  <a:tcPr/>
-                </a:tc>
-              </a:tr>
-              <a:tr h="648072">
-                <a:tc>
-                  <a:txBody>
-                    <a:bodyPr/>
-                    <a:lstStyle/>
-                    <a:p>
-                      <a:pPr algn="l"/>
-                      <a:r>
-                        <a:rPr lang="de-DE" i="1" dirty="0" smtClean="0"/>
-                        <a:t>Information </a:t>
-                      </a:r>
-                      <a:r>
-                        <a:rPr lang="de-DE" i="1" dirty="0" err="1" smtClean="0"/>
-                        <a:t>Offer</a:t>
-                      </a:r>
-                      <a:endParaRPr lang="de-DE" i="1" dirty="0"/>
-                    </a:p>
-                  </a:txBody>
-                  <a:tcPr anchor="ctr"/>
-                </a:tc>
-                <a:tc>
-                  <a:txBody>
-                    <a:bodyPr/>
-                    <a:lstStyle/>
-                    <a:p>
-                      <a:pPr algn="l"/>
-                      <a:r>
-                        <a:rPr lang="de-DE" dirty="0" smtClean="0"/>
-                        <a:t>(allgemeine) Information</a:t>
-                      </a:r>
-                      <a:endParaRPr lang="de-DE" dirty="0"/>
-                    </a:p>
-                  </a:txBody>
-                  <a:tcPr anchor="ctr"/>
-                </a:tc>
-                <a:tc>
-                  <a:txBody>
-                    <a:bodyPr/>
-                    <a:lstStyle/>
-                    <a:p>
-                      <a:endParaRPr lang="de-DE"/>
-                    </a:p>
-                  </a:txBody>
-                  <a:tcPr/>
-                </a:tc>
-              </a:tr>
-              <a:tr h="504056">
-                <a:tc>
-                  <a:txBody>
-                    <a:bodyPr/>
-                    <a:lstStyle/>
-                    <a:p>
-                      <a:pPr algn="l"/>
-                      <a:r>
-                        <a:rPr lang="de-DE" i="1" dirty="0" smtClean="0"/>
-                        <a:t>Support Request</a:t>
-                      </a:r>
-                      <a:endParaRPr lang="de-DE" i="1" dirty="0"/>
-                    </a:p>
-                  </a:txBody>
-                  <a:tcPr anchor="ctr"/>
-                </a:tc>
-                <a:tc>
-                  <a:txBody>
-                    <a:bodyPr/>
-                    <a:lstStyle/>
-                    <a:p>
-                      <a:pPr algn="l"/>
-                      <a:r>
-                        <a:rPr lang="de-DE" dirty="0" smtClean="0"/>
-                        <a:t>Unterstützungsanfrage</a:t>
-                      </a:r>
-                      <a:endParaRPr lang="de-DE" dirty="0"/>
-                    </a:p>
-                  </a:txBody>
-                  <a:tcPr anchor="ctr"/>
-                </a:tc>
-                <a:tc>
-                  <a:txBody>
-                    <a:bodyPr/>
-                    <a:lstStyle/>
-                    <a:p>
-                      <a:endParaRPr lang="de-DE"/>
-                    </a:p>
-                  </a:txBody>
-                  <a:tcPr/>
-                </a:tc>
-              </a:tr>
-              <a:tr h="504056">
-                <a:tc>
-                  <a:txBody>
-                    <a:bodyPr/>
-                    <a:lstStyle/>
-                    <a:p>
-                      <a:pPr algn="l"/>
-                      <a:r>
-                        <a:rPr lang="de-DE" i="1" dirty="0" smtClean="0"/>
-                        <a:t>Support </a:t>
-                      </a:r>
-                      <a:r>
-                        <a:rPr lang="de-DE" i="1" dirty="0" err="1" smtClean="0"/>
-                        <a:t>Offer</a:t>
-                      </a:r>
-                      <a:endParaRPr lang="de-DE" i="1" dirty="0"/>
-                    </a:p>
-                  </a:txBody>
-                  <a:tcPr anchor="ctr"/>
-                </a:tc>
-                <a:tc>
-                  <a:txBody>
-                    <a:bodyPr/>
-                    <a:lstStyle/>
-                    <a:p>
-                      <a:pPr algn="l"/>
-                      <a:r>
-                        <a:rPr lang="de-DE" dirty="0" smtClean="0"/>
-                        <a:t>Hilfsangebot</a:t>
-                      </a:r>
-                      <a:endParaRPr lang="de-DE" dirty="0"/>
-                    </a:p>
-                  </a:txBody>
-                  <a:tcPr anchor="ctr"/>
-                </a:tc>
-                <a:tc>
-                  <a:txBody>
-                    <a:bodyPr/>
-                    <a:lstStyle/>
-                    <a:p>
-                      <a:endParaRPr lang="de-DE" dirty="0"/>
-                    </a:p>
-                  </a:txBody>
-                  <a:tcPr/>
-                </a:tc>
-              </a:tr>
-              <a:tr h="432048">
-                <a:tc>
-                  <a:txBody>
-                    <a:bodyPr/>
-                    <a:lstStyle/>
-                    <a:p>
-                      <a:pPr algn="l"/>
-                      <a:r>
-                        <a:rPr lang="de-DE" i="1" dirty="0" err="1" smtClean="0"/>
-                        <a:t>Trashtalk</a:t>
-                      </a:r>
-                      <a:endParaRPr lang="de-DE" i="1" dirty="0"/>
-                    </a:p>
-                  </a:txBody>
-                  <a:tcPr anchor="ctr"/>
-                </a:tc>
-                <a:tc>
-                  <a:txBody>
-                    <a:bodyPr/>
-                    <a:lstStyle/>
-                    <a:p>
-                      <a:pPr algn="l"/>
-                      <a:r>
-                        <a:rPr lang="de-DE" dirty="0" smtClean="0"/>
-                        <a:t>Nachrichten, die in keine</a:t>
-                      </a:r>
-                      <a:r>
-                        <a:rPr lang="de-DE" baseline="0" dirty="0" smtClean="0"/>
-                        <a:t> der obigen Kategorien passen</a:t>
-                      </a:r>
-                      <a:endParaRPr lang="de-DE" dirty="0"/>
-                    </a:p>
-                  </a:txBody>
-                  <a:tcPr anchor="ctr"/>
-                </a:tc>
-                <a:tc>
-                  <a:txBody>
-                    <a:bodyPr/>
-                    <a:lstStyle/>
-                    <a:p>
-                      <a:endParaRPr lang="de-DE" dirty="0"/>
-                    </a:p>
-                  </a:txBody>
-                  <a:tcPr/>
-                </a:tc>
-              </a:tr>
-            </a:tbl>
-          </a:graphicData>
-        </a:graphic>
-      </p:graphicFrame>
-      <p:pic>
-        <p:nvPicPr>
-          <p:cNvPr id="1026" name="Picture 2" descr="C:\Users\JediForces\Downloads\marker-help.png"/>
-          <p:cNvPicPr>
-            <a:picLocks noChangeAspect="1" noChangeArrowheads="1"/>
-          </p:cNvPicPr>
-          <p:nvPr/>
-        </p:nvPicPr>
-        <p:blipFill>
-          <a:blip r:embed="rId2">
-            <a:extLst>
-              <a:ext uri="{28A0092B-C50C-407E-A947-70E740481C1C}">
-                <a14:useLocalDpi xmlns:a14="http://schemas.microsoft.com/office/drawing/2010/main" val="0"/>
-              </a:ext>
-            </a:extLst>
-          </a:blip>
-          <a:srcRect/>
-          <a:stretch>
-            <a:fillRect/>
-          </a:stretch>
-        </p:blipFill>
-        <p:spPr bwMode="auto">
-          <a:xfrm>
-            <a:off x="6609876" y="2980308"/>
-            <a:ext cx="317500" cy="520700"/>
-          </a:xfrm>
-          <a:prstGeom prst="rect">
-            <a:avLst/>
-          </a:prstGeom>
-          <a:noFill/>
-          <a:extLst>
-            <a:ext uri="{909E8E84-426E-40DD-AFC4-6F175D3DCCD1}">
-              <a14:hiddenFill xmlns:a14="http://schemas.microsoft.com/office/drawing/2010/main">
-                <a:solidFill>
-                  <a:srgbClr val="FFFFFF"/>
-                </a:solidFill>
-              </a14:hiddenFill>
-            </a:ext>
-          </a:extLst>
-        </p:spPr>
-      </p:pic>
-      <p:pic>
-        <p:nvPicPr>
-          <p:cNvPr id="1027" name="Picture 3" descr="C:\Users\JediForces\Downloads\marker-icon.png"/>
-          <p:cNvPicPr>
-            <a:picLocks noChangeAspect="1" noChangeArrowheads="1"/>
-          </p:cNvPicPr>
-          <p:nvPr/>
-        </p:nvPicPr>
-        <p:blipFill>
-          <a:blip r:embed="rId3">
-            <a:extLst>
-              <a:ext uri="{28A0092B-C50C-407E-A947-70E740481C1C}">
-                <a14:useLocalDpi xmlns:a14="http://schemas.microsoft.com/office/drawing/2010/main" val="0"/>
-              </a:ext>
-            </a:extLst>
-          </a:blip>
-          <a:stretch>
-            <a:fillRect/>
-          </a:stretch>
-        </p:blipFill>
-        <p:spPr bwMode="auto">
-          <a:xfrm>
-            <a:off x="6621595" y="5367330"/>
-            <a:ext cx="294061" cy="482261"/>
-          </a:xfrm>
-          <a:prstGeom prst="rect">
-            <a:avLst/>
-          </a:prstGeom>
-          <a:noFill/>
-          <a:extLst>
-            <a:ext uri="{909E8E84-426E-40DD-AFC4-6F175D3DCCD1}">
-              <a14:hiddenFill xmlns:a14="http://schemas.microsoft.com/office/drawing/2010/main">
-                <a:solidFill>
-                  <a:srgbClr val="FFFFFF"/>
-                </a:solidFill>
-              </a14:hiddenFill>
-            </a:ext>
-          </a:extLst>
-        </p:spPr>
-      </p:pic>
-      <p:pic>
-        <p:nvPicPr>
-          <p:cNvPr id="1028" name="Picture 4" descr="C:\Users\JediForces\Downloads\marker-information.png"/>
-          <p:cNvPicPr>
-            <a:picLocks noChangeAspect="1" noChangeArrowheads="1"/>
-          </p:cNvPicPr>
-          <p:nvPr/>
-        </p:nvPicPr>
-        <p:blipFill>
-          <a:blip r:embed="rId4">
-            <a:extLst>
-              <a:ext uri="{28A0092B-C50C-407E-A947-70E740481C1C}">
-                <a14:useLocalDpi xmlns:a14="http://schemas.microsoft.com/office/drawing/2010/main" val="0"/>
-              </a:ext>
-            </a:extLst>
-          </a:blip>
-          <a:srcRect/>
-          <a:stretch>
-            <a:fillRect/>
-          </a:stretch>
-        </p:blipFill>
-        <p:spPr bwMode="auto">
-          <a:xfrm>
-            <a:off x="6609876" y="4242156"/>
-            <a:ext cx="317500" cy="520700"/>
-          </a:xfrm>
-          <a:prstGeom prst="rect">
-            <a:avLst/>
-          </a:prstGeom>
-          <a:noFill/>
-          <a:extLst>
-            <a:ext uri="{909E8E84-426E-40DD-AFC4-6F175D3DCCD1}">
-              <a14:hiddenFill xmlns:a14="http://schemas.microsoft.com/office/drawing/2010/main">
-                <a:solidFill>
-                  <a:srgbClr val="FFFFFF"/>
-                </a:solidFill>
-              </a14:hiddenFill>
-            </a:ext>
-          </a:extLst>
-        </p:spPr>
-      </p:pic>
-      <p:pic>
-        <p:nvPicPr>
-          <p:cNvPr id="1029" name="Picture 5" descr="C:\Users\JediForces\Downloads\marker-request.png"/>
-          <p:cNvPicPr>
-            <a:picLocks noChangeAspect="1" noChangeArrowheads="1"/>
-          </p:cNvPicPr>
-          <p:nvPr/>
-        </p:nvPicPr>
-        <p:blipFill>
-          <a:blip r:embed="rId5">
-            <a:extLst>
-              <a:ext uri="{28A0092B-C50C-407E-A947-70E740481C1C}">
-                <a14:useLocalDpi xmlns:a14="http://schemas.microsoft.com/office/drawing/2010/main" val="0"/>
-              </a:ext>
-            </a:extLst>
-          </a:blip>
-          <a:srcRect/>
-          <a:stretch>
-            <a:fillRect/>
-          </a:stretch>
-        </p:blipFill>
-        <p:spPr bwMode="auto">
-          <a:xfrm>
-            <a:off x="6609876" y="3573016"/>
-            <a:ext cx="317500" cy="520700"/>
-          </a:xfrm>
-          <a:prstGeom prst="rect">
-            <a:avLst/>
-          </a:prstGeom>
-          <a:noFill/>
-          <a:extLst>
-            <a:ext uri="{909E8E84-426E-40DD-AFC4-6F175D3DCCD1}">
-              <a14:hiddenFill xmlns:a14="http://schemas.microsoft.com/office/drawing/2010/main">
-                <a:solidFill>
-                  <a:srgbClr val="FFFFFF"/>
-                </a:solidFill>
-              </a14:hiddenFill>
-            </a:ext>
-          </a:extLst>
-        </p:spPr>
-      </p:pic>
-      <p:sp>
-        <p:nvSpPr>
-          <p:cNvPr id="6" name="Geschweifte Klammer rechts 5"/>
-          <p:cNvSpPr/>
-          <p:nvPr/>
-        </p:nvSpPr>
-        <p:spPr>
-          <a:xfrm>
-            <a:off x="6156176" y="5013176"/>
-            <a:ext cx="288032" cy="1152128"/>
-          </a:xfrm>
-          <a:prstGeom prst="rightBrace">
-            <a:avLst/>
-          </a:prstGeom>
-        </p:spPr>
-        <p:style>
-          <a:lnRef idx="1">
-            <a:schemeClr val="accent1"/>
-          </a:lnRef>
-          <a:fillRef idx="0">
-            <a:schemeClr val="accent1"/>
-          </a:fillRef>
-          <a:effectRef idx="0">
-            <a:schemeClr val="accent1"/>
-          </a:effectRef>
-          <a:fontRef idx="minor">
-            <a:schemeClr val="tx1"/>
-          </a:fontRef>
-        </p:style>
-        <p:txBody>
-          <a:bodyPr rtlCol="0" anchor="ctr"/>
-          <a:lstStyle/>
-          <a:p>
-            <a:pPr algn="ctr"/>
-            <a:endParaRPr lang="de-DE"/>
-          </a:p>
-        </p:txBody>
-      </p:sp>
-    </p:spTree>
-    <p:extLst>
-      <p:ext uri="{BB962C8B-B14F-4D97-AF65-F5344CB8AC3E}">
-        <p14:creationId xmlns:p14="http://schemas.microsoft.com/office/powerpoint/2010/main" val="3202145837"/>
-      </p:ext>
-    </p:extLst>
-  </p:cSld>
-  <p:clrMapOvr>
-    <a:masterClrMapping/>
-  </p:clrMapOvr>
-  <p:timing>
-    <p:tnLst>
-      <p:par>
-        <p:cTn id="1" dur="indefinite" restart="never" nodeType="tmRoot"/>
-      </p:par>
-    </p:tnLst>
-  </p:timing>
-</p:sld>
-</file>
-
-<file path=ppt/slides/slide4.xml><?xml version="1.0" encoding="utf-8"?>
-<p:sld xmlns:a="http://schemas.openxmlformats.org/drawingml/2006/main" xmlns:r="http://schemas.openxmlformats.org/officeDocument/2006/relationships" xmlns:p="http://schemas.openxmlformats.org/presentationml/2006/main">
-  <p:cSld>
-    <p:spTree>
-      <p:nvGrpSpPr>
-        <p:cNvPr id="1" name=""/>
-        <p:cNvGrpSpPr/>
-        <p:nvPr/>
-      </p:nvGrpSpPr>
-      <p:grpSpPr>
-        <a:xfrm>
-          <a:off x="0" y="0"/>
-          <a:ext cx="0" cy="0"/>
-          <a:chOff x="0" y="0"/>
-          <a:chExt cx="0" cy="0"/>
-        </a:xfrm>
-      </p:grpSpPr>
-      <p:sp>
-        <p:nvSpPr>
-          <p:cNvPr id="2" name="Titel 1"/>
-          <p:cNvSpPr>
-            <a:spLocks noGrp="1"/>
-          </p:cNvSpPr>
-          <p:nvPr>
-            <p:ph type="title"/>
-          </p:nvPr>
-        </p:nvSpPr>
-        <p:spPr/>
-        <p:txBody>
-          <a:bodyPr/>
-          <a:lstStyle/>
-          <a:p>
-            <a:r>
-              <a:rPr lang="de-DE" dirty="0" smtClean="0"/>
-              <a:t>Zeitbereichsauswahl</a:t>
-            </a:r>
-            <a:endParaRPr lang="de-DE" dirty="0"/>
-          </a:p>
-        </p:txBody>
-      </p:sp>
-      <p:sp>
-        <p:nvSpPr>
-          <p:cNvPr id="3" name="Inhaltsplatzhalter 2"/>
-          <p:cNvSpPr>
-            <a:spLocks noGrp="1"/>
-          </p:cNvSpPr>
-          <p:nvPr>
-            <p:ph idx="1"/>
-          </p:nvPr>
-        </p:nvSpPr>
-        <p:spPr>
-          <a:xfrm>
-            <a:off x="457200" y="1639341"/>
-            <a:ext cx="8229600" cy="3733875"/>
-          </a:xfrm>
-        </p:spPr>
-        <p:txBody>
-          <a:bodyPr>
-            <a:normAutofit/>
-          </a:bodyPr>
-          <a:lstStyle/>
-          <a:p>
-            <a:r>
-              <a:rPr lang="de-DE" sz="2800" dirty="0"/>
-              <a:t>mit dem Schieberegler kann ein Zeitintervall ausgewählt </a:t>
-            </a:r>
-            <a:r>
-              <a:rPr lang="de-DE" sz="2800" dirty="0" smtClean="0"/>
-              <a:t>werden</a:t>
-            </a:r>
-          </a:p>
-          <a:p>
-            <a:pPr lvl="1"/>
-            <a:r>
-              <a:rPr lang="de-DE" sz="2000" dirty="0"/>
-              <a:t>das Intervall reicht vom aktuellen Zeitpunkt bis X Minuten in die </a:t>
-            </a:r>
-            <a:r>
-              <a:rPr lang="de-DE" sz="2000" dirty="0" smtClean="0"/>
-              <a:t>Vergangenheit</a:t>
-            </a:r>
-          </a:p>
-          <a:p>
-            <a:pPr marL="457200" lvl="1" indent="0">
-              <a:buNone/>
-            </a:pPr>
-            <a:endParaRPr lang="de-DE" sz="800" dirty="0" smtClean="0"/>
-          </a:p>
-          <a:p>
-            <a:r>
-              <a:rPr lang="de-DE" sz="2800" dirty="0"/>
-              <a:t>Es werden nur die Posts angezeigt, die innerhalb des Intervalls gesendet </a:t>
-            </a:r>
-            <a:r>
-              <a:rPr lang="de-DE" sz="2800" dirty="0" smtClean="0"/>
-              <a:t>wurden</a:t>
-            </a:r>
-          </a:p>
-          <a:p>
-            <a:pPr marL="0" indent="0">
-              <a:buNone/>
-            </a:pPr>
-            <a:endParaRPr lang="de-DE" sz="800" dirty="0" smtClean="0"/>
-          </a:p>
-          <a:p>
-            <a:r>
-              <a:rPr lang="de-DE" sz="2800" dirty="0"/>
-              <a:t>Der Zeitbereich gilt für alle </a:t>
-            </a:r>
-            <a:r>
-              <a:rPr lang="de-DE" sz="2800" dirty="0" err="1"/>
-              <a:t>Widgets</a:t>
-            </a:r>
-            <a:r>
-              <a:rPr lang="de-DE" sz="2800" dirty="0"/>
-              <a:t>!</a:t>
-            </a:r>
-          </a:p>
-        </p:txBody>
-      </p:sp>
-      <p:pic>
-        <p:nvPicPr>
-          <p:cNvPr id="3075" name="Picture 3"/>
-          <p:cNvPicPr>
-            <a:picLocks noChangeAspect="1" noChangeArrowheads="1"/>
-          </p:cNvPicPr>
-          <p:nvPr/>
-        </p:nvPicPr>
-        <p:blipFill>
-          <a:blip r:embed="rId2">
-            <a:extLst>
-              <a:ext uri="{28A0092B-C50C-407E-A947-70E740481C1C}">
-                <a14:useLocalDpi xmlns:a14="http://schemas.microsoft.com/office/drawing/2010/main" val="0"/>
-              </a:ext>
-            </a:extLst>
-          </a:blip>
-          <a:srcRect/>
-          <a:stretch>
-            <a:fillRect/>
-          </a:stretch>
-        </p:blipFill>
-        <p:spPr bwMode="auto">
-          <a:xfrm>
-            <a:off x="2195736" y="5220641"/>
-            <a:ext cx="4176464" cy="946230"/>
-          </a:xfrm>
-          <a:prstGeom prst="rect">
-            <a:avLst/>
-          </a:prstGeom>
-          <a:noFill/>
-          <a:ln>
-            <a:noFill/>
-          </a:ln>
-          <a:extLst>
-            <a:ext uri="{909E8E84-426E-40DD-AFC4-6F175D3DCCD1}">
-              <a14:hiddenFill xmlns:a14="http://schemas.microsoft.com/office/drawing/2010/main">
-                <a:solidFill>
-                  <a:schemeClr val="accent1"/>
-                </a:solidFill>
-              </a14:hiddenFill>
-            </a:ext>
-            <a:ext uri="{91240B29-F687-4F45-9708-019B960494DF}">
-              <a14:hiddenLine xmlns:a14="http://schemas.microsoft.com/office/drawing/2010/main" w="9525">
-                <a:solidFill>
-                  <a:schemeClr val="tx1"/>
-                </a:solidFill>
-                <a:miter lim="800000"/>
-                <a:headEnd/>
-                <a:tailEnd/>
-              </a14:hiddenLine>
-            </a:ext>
-          </a:extLst>
-        </p:spPr>
-      </p:pic>
-    </p:spTree>
-    <p:extLst>
-      <p:ext uri="{BB962C8B-B14F-4D97-AF65-F5344CB8AC3E}">
-        <p14:creationId xmlns:p14="http://schemas.microsoft.com/office/powerpoint/2010/main" val="2972371185"/>
-      </p:ext>
-    </p:extLst>
-  </p:cSld>
-  <p:clrMapOvr>
-    <a:masterClrMapping/>
-  </p:clrMapOvr>
-  <p:timing>
-    <p:tnLst>
-      <p:par>
-        <p:cTn id="1" dur="indefinite" restart="never" nodeType="tmRoot"/>
-      </p:par>
-    </p:tnLst>
-  </p:timing>
-</p:sld>
-</file>
-
-<file path=ppt/slides/slide5.xml><?xml version="1.0" encoding="utf-8"?>
-<p:sld xmlns:a="http://schemas.openxmlformats.org/drawingml/2006/main" xmlns:r="http://schemas.openxmlformats.org/officeDocument/2006/relationships" xmlns:p="http://schemas.openxmlformats.org/presentationml/2006/main">
-  <p:cSld>
-    <p:spTree>
-      <p:nvGrpSpPr>
-        <p:cNvPr id="1" name=""/>
-        <p:cNvGrpSpPr/>
-        <p:nvPr/>
-      </p:nvGrpSpPr>
-      <p:grpSpPr>
-        <a:xfrm>
-          <a:off x="0" y="0"/>
-          <a:ext cx="0" cy="0"/>
-          <a:chOff x="0" y="0"/>
-          <a:chExt cx="0" cy="0"/>
-        </a:xfrm>
-      </p:grpSpPr>
-      <p:sp>
-        <p:nvSpPr>
-          <p:cNvPr id="2" name="Titel 1"/>
-          <p:cNvSpPr>
-            <a:spLocks noGrp="1"/>
-          </p:cNvSpPr>
-          <p:nvPr>
-            <p:ph type="title"/>
-          </p:nvPr>
-        </p:nvSpPr>
-        <p:spPr/>
-        <p:txBody>
-          <a:bodyPr/>
-          <a:lstStyle/>
-          <a:p>
-            <a:r>
-              <a:rPr lang="de-DE" dirty="0" smtClean="0"/>
-              <a:t>Kartenansicht</a:t>
-            </a:r>
-            <a:endParaRPr lang="de-DE" dirty="0"/>
-          </a:p>
-        </p:txBody>
-      </p:sp>
-      <p:sp>
-        <p:nvSpPr>
-          <p:cNvPr id="3" name="Inhaltsplatzhalter 2"/>
-          <p:cNvSpPr>
-            <a:spLocks noGrp="1"/>
-          </p:cNvSpPr>
-          <p:nvPr>
-            <p:ph idx="1"/>
-          </p:nvPr>
-        </p:nvSpPr>
-        <p:spPr>
-          <a:xfrm>
-            <a:off x="395536" y="1600201"/>
-            <a:ext cx="8229600" cy="1396751"/>
-          </a:xfrm>
-        </p:spPr>
-        <p:txBody>
-          <a:bodyPr>
-            <a:normAutofit/>
-          </a:bodyPr>
-          <a:lstStyle/>
-          <a:p>
-            <a:r>
-              <a:rPr lang="de-DE" sz="2800" dirty="0"/>
-              <a:t>visualisiert die Position der </a:t>
-            </a:r>
-            <a:r>
-              <a:rPr lang="de-DE" sz="2800" dirty="0" smtClean="0"/>
-              <a:t>Tweets</a:t>
-            </a:r>
-            <a:endParaRPr lang="de-DE" sz="900" dirty="0" smtClean="0"/>
-          </a:p>
-          <a:p>
-            <a:r>
-              <a:rPr lang="de-DE" sz="2800" dirty="0"/>
-              <a:t>Kartenausschnitt ist frei beweglich und </a:t>
-            </a:r>
-            <a:r>
-              <a:rPr lang="de-DE" sz="2800" dirty="0" err="1" smtClean="0"/>
-              <a:t>zoombar</a:t>
-            </a:r>
-            <a:endParaRPr lang="de-DE" sz="2800" dirty="0" smtClean="0"/>
-          </a:p>
-        </p:txBody>
-      </p:sp>
-      <p:sp>
-        <p:nvSpPr>
-          <p:cNvPr id="4" name="Textfeld 3"/>
-          <p:cNvSpPr txBox="1"/>
-          <p:nvPr/>
-        </p:nvSpPr>
-        <p:spPr>
-          <a:xfrm>
-            <a:off x="395536" y="2636912"/>
-            <a:ext cx="2736304" cy="3693319"/>
-          </a:xfrm>
-          <a:prstGeom prst="rect">
-            <a:avLst/>
-          </a:prstGeom>
-          <a:noFill/>
-        </p:spPr>
-        <p:txBody>
-          <a:bodyPr wrap="square" rtlCol="0">
-            <a:spAutoFit/>
-          </a:bodyPr>
-          <a:lstStyle/>
-          <a:p>
-            <a:pPr marL="355600" indent="-355600">
-              <a:buFont typeface="Arial" panose="020B0604020202020204" pitchFamily="34" charset="0"/>
-              <a:buChar char="•"/>
-            </a:pPr>
-            <a:r>
-              <a:rPr lang="de-DE" sz="2800" dirty="0"/>
-              <a:t>zeigt nur Tweets mit </a:t>
-            </a:r>
-            <a:r>
-              <a:rPr lang="de-DE" sz="2800" dirty="0" smtClean="0"/>
-              <a:t>Positions-daten an</a:t>
-            </a:r>
-          </a:p>
-          <a:p>
-            <a:endParaRPr lang="de-DE" sz="400" dirty="0"/>
-          </a:p>
-          <a:p>
-            <a:pPr marL="627063" lvl="1" indent="-271463">
-              <a:buFont typeface="Arial" panose="020B0604020202020204" pitchFamily="34" charset="0"/>
-              <a:buChar char="•"/>
-            </a:pPr>
-            <a:r>
-              <a:rPr lang="de-DE" sz="2000" dirty="0"/>
-              <a:t>5% besitzen Koordinaten, weitere xx% werden angenähert</a:t>
-            </a:r>
-          </a:p>
-          <a:p>
-            <a:endParaRPr lang="de-DE" dirty="0"/>
-          </a:p>
-        </p:txBody>
-      </p:sp>
-      <p:pic>
-        <p:nvPicPr>
-          <p:cNvPr id="4099" name="Picture 3" descr="C:\Users\JediForces\Desktop\03-map.png"/>
-          <p:cNvPicPr>
-            <a:picLocks noChangeAspect="1" noChangeArrowheads="1"/>
-          </p:cNvPicPr>
-          <p:nvPr/>
-        </p:nvPicPr>
-        <p:blipFill>
-          <a:blip r:embed="rId2">
-            <a:extLst>
-              <a:ext uri="{28A0092B-C50C-407E-A947-70E740481C1C}">
-                <a14:useLocalDpi xmlns:a14="http://schemas.microsoft.com/office/drawing/2010/main" val="0"/>
-              </a:ext>
-            </a:extLst>
-          </a:blip>
-          <a:srcRect/>
-          <a:stretch>
-            <a:fillRect/>
-          </a:stretch>
-        </p:blipFill>
-        <p:spPr bwMode="auto">
-          <a:xfrm>
-            <a:off x="2771800" y="2740268"/>
-            <a:ext cx="6372200" cy="4121269"/>
-          </a:xfrm>
-          <a:prstGeom prst="rect">
-            <a:avLst/>
-          </a:prstGeom>
-          <a:noFill/>
-          <a:extLst>
-            <a:ext uri="{909E8E84-426E-40DD-AFC4-6F175D3DCCD1}">
-              <a14:hiddenFill xmlns:a14="http://schemas.microsoft.com/office/drawing/2010/main">
-                <a:solidFill>
-                  <a:srgbClr val="FFFFFF"/>
-                </a:solidFill>
-              </a14:hiddenFill>
-            </a:ext>
-          </a:extLst>
-        </p:spPr>
-      </p:pic>
-    </p:spTree>
-    <p:extLst>
-      <p:ext uri="{BB962C8B-B14F-4D97-AF65-F5344CB8AC3E}">
-        <p14:creationId xmlns:p14="http://schemas.microsoft.com/office/powerpoint/2010/main" val="2972371185"/>
-      </p:ext>
-    </p:extLst>
-  </p:cSld>
-  <p:clrMapOvr>
-    <a:masterClrMapping/>
-  </p:clrMapOvr>
-  <p:timing>
-    <p:tnLst>
-      <p:par>
-        <p:cTn id="1" dur="indefinite" restart="never" nodeType="tmRoot"/>
-      </p:par>
-    </p:tnLst>
-  </p:timing>
-</p:sld>
-</file>
-
-<file path=ppt/slides/slide6.xml><?xml version="1.0" encoding="utf-8"?>
-<p:sld xmlns:a="http://schemas.openxmlformats.org/drawingml/2006/main" xmlns:r="http://schemas.openxmlformats.org/officeDocument/2006/relationships" xmlns:p="http://schemas.openxmlformats.org/presentationml/2006/main">
-  <p:cSld>
-    <p:spTree>
-      <p:nvGrpSpPr>
-        <p:cNvPr id="1" name=""/>
-        <p:cNvGrpSpPr/>
-        <p:nvPr/>
-      </p:nvGrpSpPr>
-      <p:grpSpPr>
-        <a:xfrm>
-          <a:off x="0" y="0"/>
-          <a:ext cx="0" cy="0"/>
-          <a:chOff x="0" y="0"/>
-          <a:chExt cx="0" cy="0"/>
-        </a:xfrm>
-      </p:grpSpPr>
-      <p:sp>
-        <p:nvSpPr>
-          <p:cNvPr id="2" name="Titel 1"/>
-          <p:cNvSpPr>
-            <a:spLocks noGrp="1"/>
-          </p:cNvSpPr>
-          <p:nvPr>
-            <p:ph type="title"/>
-          </p:nvPr>
-        </p:nvSpPr>
-        <p:spPr/>
-        <p:txBody>
-          <a:bodyPr/>
-          <a:lstStyle/>
-          <a:p>
-            <a:r>
-              <a:rPr lang="de-DE" dirty="0" smtClean="0"/>
-              <a:t>Kartenansicht</a:t>
-            </a:r>
-            <a:endParaRPr lang="de-DE" dirty="0"/>
-          </a:p>
-        </p:txBody>
-      </p:sp>
-      <p:sp>
-        <p:nvSpPr>
-          <p:cNvPr id="3" name="Inhaltsplatzhalter 2"/>
-          <p:cNvSpPr>
-            <a:spLocks noGrp="1"/>
-          </p:cNvSpPr>
-          <p:nvPr>
-            <p:ph idx="1"/>
-          </p:nvPr>
-        </p:nvSpPr>
-        <p:spPr>
-          <a:xfrm>
-            <a:off x="457200" y="1731896"/>
-            <a:ext cx="8229600" cy="1108720"/>
-          </a:xfrm>
-        </p:spPr>
-        <p:txBody>
-          <a:bodyPr>
-            <a:normAutofit/>
-          </a:bodyPr>
-          <a:lstStyle/>
-          <a:p>
-            <a:pPr marL="0" indent="0">
-              <a:buNone/>
-            </a:pPr>
-            <a:r>
-              <a:rPr lang="de-DE" sz="2800" dirty="0" smtClean="0"/>
-              <a:t>Per </a:t>
-            </a:r>
-            <a:r>
-              <a:rPr lang="de-DE" sz="2800" dirty="0"/>
-              <a:t>Klick auf eine Markierung wird ein </a:t>
-            </a:r>
-            <a:r>
-              <a:rPr lang="de-DE" sz="2800" dirty="0" smtClean="0"/>
-              <a:t>Pop-Up eingeblendet:</a:t>
-            </a:r>
-          </a:p>
-        </p:txBody>
-      </p:sp>
-      <p:pic>
-        <p:nvPicPr>
-          <p:cNvPr id="5122" name="Picture 2" descr="C:\Users\JediForces\Desktop\04-popup.png"/>
-          <p:cNvPicPr>
-            <a:picLocks noChangeAspect="1" noChangeArrowheads="1"/>
-          </p:cNvPicPr>
-          <p:nvPr/>
-        </p:nvPicPr>
-        <p:blipFill>
-          <a:blip r:embed="rId2">
-            <a:extLst>
-              <a:ext uri="{28A0092B-C50C-407E-A947-70E740481C1C}">
-                <a14:useLocalDpi xmlns:a14="http://schemas.microsoft.com/office/drawing/2010/main" val="0"/>
-              </a:ext>
-            </a:extLst>
-          </a:blip>
-          <a:stretch>
-            <a:fillRect/>
-          </a:stretch>
-        </p:blipFill>
-        <p:spPr bwMode="auto">
-          <a:xfrm>
-            <a:off x="539552" y="2780928"/>
-            <a:ext cx="4248472" cy="3922530"/>
-          </a:xfrm>
-          <a:prstGeom prst="rect">
-            <a:avLst/>
-          </a:prstGeom>
-          <a:ln>
-            <a:noFill/>
-          </a:ln>
-          <a:effectLst>
-            <a:softEdge rad="112500"/>
-          </a:effectLst>
-          <a:extLst>
-            <a:ext uri="{909E8E84-426E-40DD-AFC4-6F175D3DCCD1}">
-              <a14:hiddenFill xmlns:a14="http://schemas.microsoft.com/office/drawing/2010/main">
-                <a:solidFill>
-                  <a:srgbClr val="FFFFFF"/>
-                </a:solidFill>
-              </a14:hiddenFill>
-            </a:ext>
-          </a:extLst>
-        </p:spPr>
-      </p:pic>
-      <p:sp>
-        <p:nvSpPr>
-          <p:cNvPr id="4" name="Textfeld 3"/>
-          <p:cNvSpPr txBox="1"/>
-          <p:nvPr/>
-        </p:nvSpPr>
-        <p:spPr>
-          <a:xfrm>
-            <a:off x="4860032" y="2708920"/>
-            <a:ext cx="4211960" cy="3908762"/>
-          </a:xfrm>
-          <a:prstGeom prst="rect">
-            <a:avLst/>
-          </a:prstGeom>
-          <a:noFill/>
-        </p:spPr>
-        <p:txBody>
-          <a:bodyPr wrap="square" rtlCol="0">
-            <a:spAutoFit/>
-          </a:bodyPr>
-          <a:lstStyle/>
-          <a:p>
-            <a:r>
-              <a:rPr lang="de-DE" sz="2400" dirty="0" smtClean="0"/>
-              <a:t>Dies zeigt </a:t>
-            </a:r>
-            <a:r>
-              <a:rPr lang="de-DE" sz="2400" dirty="0"/>
-              <a:t>die Daten des Tweets an</a:t>
-            </a:r>
-            <a:r>
-              <a:rPr lang="de-DE" sz="2400" dirty="0" smtClean="0"/>
-              <a:t>:</a:t>
-            </a:r>
-          </a:p>
-          <a:p>
-            <a:endParaRPr lang="de-DE" sz="800" dirty="0"/>
-          </a:p>
-          <a:p>
-            <a:pPr marL="531813" lvl="1" indent="-258763">
-              <a:buFont typeface="Symbol" panose="05050102010706020507" pitchFamily="18" charset="2"/>
-              <a:buChar char="-"/>
-            </a:pPr>
-            <a:r>
-              <a:rPr lang="de-DE" sz="2400" dirty="0" smtClean="0"/>
-              <a:t>ermittelte Kategorie</a:t>
-            </a:r>
-          </a:p>
-          <a:p>
-            <a:pPr marL="531813" lvl="1" indent="-258763">
-              <a:buFont typeface="Symbol" panose="05050102010706020507" pitchFamily="18" charset="2"/>
-              <a:buChar char="-"/>
-            </a:pPr>
-            <a:r>
-              <a:rPr lang="de-DE" sz="2400" dirty="0" smtClean="0"/>
-              <a:t>Sendezeit</a:t>
-            </a:r>
-          </a:p>
-          <a:p>
-            <a:pPr marL="531813" lvl="1" indent="-258763">
-              <a:buFont typeface="Symbol" panose="05050102010706020507" pitchFamily="18" charset="2"/>
-              <a:buChar char="-"/>
-            </a:pPr>
-            <a:r>
-              <a:rPr lang="de-DE" sz="2400" dirty="0" smtClean="0"/>
-              <a:t>Absender</a:t>
-            </a:r>
-            <a:endParaRPr lang="de-DE" sz="2400" dirty="0"/>
-          </a:p>
-          <a:p>
-            <a:pPr marL="531813" lvl="1" indent="-258763">
-              <a:buFont typeface="Symbol" panose="05050102010706020507" pitchFamily="18" charset="2"/>
-              <a:buChar char="-"/>
-            </a:pPr>
-            <a:r>
-              <a:rPr lang="de-DE" sz="2400" dirty="0" smtClean="0"/>
-              <a:t>Nachrichtentext</a:t>
-            </a:r>
-            <a:endParaRPr lang="de-DE" sz="2400" dirty="0"/>
-          </a:p>
-          <a:p>
-            <a:pPr marL="531813" lvl="1" indent="-258763">
-              <a:buFont typeface="Symbol" panose="05050102010706020507" pitchFamily="18" charset="2"/>
-              <a:buChar char="-"/>
-            </a:pPr>
-            <a:r>
-              <a:rPr lang="de-DE" sz="2400" dirty="0" smtClean="0"/>
-              <a:t>Koordinaten</a:t>
-            </a:r>
-          </a:p>
-          <a:p>
-            <a:pPr marL="342900" indent="-247650">
-              <a:buFont typeface="Symbol" panose="05050102010706020507" pitchFamily="18" charset="2"/>
-              <a:buChar char="-"/>
-            </a:pPr>
-            <a:endParaRPr lang="de-DE" sz="2400" dirty="0"/>
-          </a:p>
-          <a:p>
-            <a:pPr marL="438150" indent="-342900">
-              <a:buFont typeface="Wingdings" panose="05000000000000000000" pitchFamily="2" charset="2"/>
-              <a:buChar char="ü"/>
-            </a:pPr>
-            <a:r>
-              <a:rPr lang="de-DE" sz="2400" dirty="0" smtClean="0"/>
-              <a:t>Alle wichtigen Informationen auf einen Blick</a:t>
-            </a:r>
-            <a:endParaRPr lang="de-DE" sz="2400" dirty="0"/>
-          </a:p>
-        </p:txBody>
-      </p:sp>
-    </p:spTree>
-    <p:extLst>
-      <p:ext uri="{BB962C8B-B14F-4D97-AF65-F5344CB8AC3E}">
-        <p14:creationId xmlns:p14="http://schemas.microsoft.com/office/powerpoint/2010/main" val="2972371185"/>
-      </p:ext>
-    </p:extLst>
-  </p:cSld>
-  <p:clrMapOvr>
-    <a:masterClrMapping/>
-  </p:clrMapOvr>
-  <p:timing>
-    <p:tnLst>
-      <p:par>
-        <p:cTn id="1" dur="indefinite" restart="never" nodeType="tmRoot"/>
-      </p:par>
-    </p:tnLst>
-  </p:timing>
-</p:sld>
-</file>
-
-<file path=ppt/slides/slide7.xml><?xml version="1.0" encoding="utf-8"?>
-<p:sld xmlns:a="http://schemas.openxmlformats.org/drawingml/2006/main" xmlns:r="http://schemas.openxmlformats.org/officeDocument/2006/relationships" xmlns:p="http://schemas.openxmlformats.org/presentationml/2006/main">
-  <p:cSld>
-    <p:spTree>
-      <p:nvGrpSpPr>
-        <p:cNvPr id="1" name=""/>
-        <p:cNvGrpSpPr/>
-        <p:nvPr/>
-      </p:nvGrpSpPr>
-      <p:grpSpPr>
-        <a:xfrm>
-          <a:off x="0" y="0"/>
-          <a:ext cx="0" cy="0"/>
-          <a:chOff x="0" y="0"/>
-          <a:chExt cx="0" cy="0"/>
-        </a:xfrm>
-      </p:grpSpPr>
-      <p:sp>
-        <p:nvSpPr>
-          <p:cNvPr id="2" name="Titel 1"/>
-          <p:cNvSpPr>
-            <a:spLocks noGrp="1"/>
-          </p:cNvSpPr>
-          <p:nvPr>
-            <p:ph type="title"/>
-          </p:nvPr>
-        </p:nvSpPr>
-        <p:spPr/>
-        <p:txBody>
-          <a:bodyPr/>
-          <a:lstStyle/>
-          <a:p>
-            <a:r>
-              <a:rPr lang="de-DE" dirty="0" smtClean="0"/>
               <a:t>Hashtag-Wolke</a:t>
             </a:r>
             <a:endParaRPr lang="de-DE" dirty="0"/>
@@ -5001,7 +4405,6 @@
               <a:rPr lang="de-DE" sz="2800" dirty="0" smtClean="0"/>
               <a:t>Schnelle Erkennung relevanter Themen</a:t>
             </a:r>
-            <a:endParaRPr lang="de-DE" sz="2800" dirty="0" smtClean="0"/>
           </a:p>
         </p:txBody>
       </p:sp>
@@ -5014,7 +4417,7 @@
           <p:nvPr/>
         </p:nvPicPr>
         <p:blipFill>
-          <a:blip r:embed="rId2">
+          <a:blip r:embed="rId3">
             <a:extLst>
               <a:ext uri="{28A0092B-C50C-407E-A947-70E740481C1C}">
                 <a14:useLocalDpi xmlns:a14="http://schemas.microsoft.com/office/drawing/2010/main" val="0"/>
@@ -5346,4 +4749,289 @@
   <a:objectDefaults/>
   <a:extraClrSchemeLst/>
 </a:theme>
+</file>
+
+<file path=ppt/theme/theme2.xml><?xml version="1.0" encoding="utf-8"?>
+<a:theme xmlns:a="http://schemas.openxmlformats.org/drawingml/2006/main" name="Larissa">
+  <a:themeElements>
+    <a:clrScheme name="Larissa">
+      <a:dk1>
+        <a:sysClr val="windowText" lastClr="000000"/>
+      </a:dk1>
+      <a:lt1>
+        <a:sysClr val="window" lastClr="FFFFFF"/>
+      </a:lt1>
+      <a:dk2>
+        <a:srgbClr val="1F497D"/>
+      </a:dk2>
+      <a:lt2>
+        <a:srgbClr val="EEECE1"/>
+      </a:lt2>
+      <a:accent1>
+        <a:srgbClr val="4F81BD"/>
+      </a:accent1>
+      <a:accent2>
+        <a:srgbClr val="C0504D"/>
+      </a:accent2>
+      <a:accent3>
+        <a:srgbClr val="9BBB59"/>
+      </a:accent3>
+      <a:accent4>
+        <a:srgbClr val="8064A2"/>
+      </a:accent4>
+      <a:accent5>
+        <a:srgbClr val="4BACC6"/>
+      </a:accent5>
+      <a:accent6>
+        <a:srgbClr val="F79646"/>
+      </a:accent6>
+      <a:hlink>
+        <a:srgbClr val="0000FF"/>
+      </a:hlink>
+      <a:folHlink>
+        <a:srgbClr val="800080"/>
+      </a:folHlink>
+    </a:clrScheme>
+    <a:fontScheme name="Larissa">
+      <a:majorFont>
+        <a:latin typeface="Calibri"/>
+        <a:ea typeface=""/>
+        <a:cs typeface=""/>
+        <a:font script="Jpan" typeface="ＭＳ Ｐゴシック"/>
+        <a:font script="Hang" typeface="맑은 고딕"/>
+        <a:font script="Hans" typeface="宋体"/>
+        <a:font script="Hant" typeface="新細明體"/>
+        <a:font script="Arab" typeface="Times New Roman"/>
+        <a:font script="Hebr" typeface="Times New Roman"/>
+        <a:font script="Thai" typeface="Angsana New"/>
+        <a:font script="Ethi" typeface="Nyala"/>
+        <a:font script="Beng" typeface="Vrinda"/>
+        <a:font script="Gujr" typeface="Shruti"/>
+        <a:font script="Khmr" typeface="MoolBoran"/>
+        <a:font script="Knda" typeface="Tunga"/>
+        <a:font script="Guru" typeface="Raavi"/>
+        <a:font script="Cans" typeface="Euphemia"/>
+        <a:font script="Cher" typeface="Plantagenet Cherokee"/>
+        <a:font script="Yiii" typeface="Microsoft Yi Baiti"/>
+        <a:font script="Tibt" typeface="Microsoft Himalaya"/>
+        <a:font script="Thaa" typeface="MV Boli"/>
+        <a:font script="Deva" typeface="Mangal"/>
+        <a:font script="Telu" typeface="Gautami"/>
+        <a:font script="Taml" typeface="Latha"/>
+        <a:font script="Syrc" typeface="Estrangelo Edessa"/>
+        <a:font script="Orya" typeface="Kalinga"/>
+        <a:font script="Mlym" typeface="Kartika"/>
+        <a:font script="Laoo" typeface="DokChampa"/>
+        <a:font script="Sinh" typeface="Iskoola Pota"/>
+        <a:font script="Mong" typeface="Mongolian Baiti"/>
+        <a:font script="Viet" typeface="Times New Roman"/>
+        <a:font script="Uigh" typeface="Microsoft Uighur"/>
+        <a:font script="Geor" typeface="Sylfaen"/>
+      </a:majorFont>
+      <a:minorFont>
+        <a:latin typeface="Calibri"/>
+        <a:ea typeface=""/>
+        <a:cs typeface=""/>
+        <a:font script="Jpan" typeface="ＭＳ Ｐゴシック"/>
+        <a:font script="Hang" typeface="맑은 고딕"/>
+        <a:font script="Hans" typeface="宋体"/>
+        <a:font script="Hant" typeface="新細明體"/>
+        <a:font script="Arab" typeface="Arial"/>
+        <a:font script="Hebr" typeface="Arial"/>
+        <a:font script="Thai" typeface="Cordia New"/>
+        <a:font script="Ethi" typeface="Nyala"/>
+        <a:font script="Beng" typeface="Vrinda"/>
+        <a:font script="Gujr" typeface="Shruti"/>
+        <a:font script="Khmr" typeface="DaunPenh"/>
+        <a:font script="Knda" typeface="Tunga"/>
+        <a:font script="Guru" typeface="Raavi"/>
+        <a:font script="Cans" typeface="Euphemia"/>
+        <a:font script="Cher" typeface="Plantagenet Cherokee"/>
+        <a:font script="Yiii" typeface="Microsoft Yi Baiti"/>
+        <a:font script="Tibt" typeface="Microsoft Himalaya"/>
+        <a:font script="Thaa" typeface="MV Boli"/>
+        <a:font script="Deva" typeface="Mangal"/>
+        <a:font script="Telu" typeface="Gautami"/>
+        <a:font script="Taml" typeface="Latha"/>
+        <a:font script="Syrc" typeface="Estrangelo Edessa"/>
+        <a:font script="Orya" typeface="Kalinga"/>
+        <a:font script="Mlym" typeface="Kartika"/>
+        <a:font script="Laoo" typeface="DokChampa"/>
+        <a:font script="Sinh" typeface="Iskoola Pota"/>
+        <a:font script="Mong" typeface="Mongolian Baiti"/>
+        <a:font script="Viet" typeface="Arial"/>
+        <a:font script="Uigh" typeface="Microsoft Uighur"/>
+        <a:font script="Geor" typeface="Sylfaen"/>
+      </a:minorFont>
+    </a:fontScheme>
+    <a:fmtScheme name="Larissa">
+      <a:fillStyleLst>
+        <a:solidFill>
+          <a:schemeClr val="phClr"/>
+        </a:solidFill>
+        <a:gradFill rotWithShape="1">
+          <a:gsLst>
+            <a:gs pos="0">
+              <a:schemeClr val="phClr">
+                <a:tint val="50000"/>
+                <a:satMod val="300000"/>
+              </a:schemeClr>
+            </a:gs>
+            <a:gs pos="35000">
+              <a:schemeClr val="phClr">
+                <a:tint val="37000"/>
+                <a:satMod val="300000"/>
+              </a:schemeClr>
+            </a:gs>
+            <a:gs pos="100000">
+              <a:schemeClr val="phClr">
+                <a:tint val="15000"/>
+                <a:satMod val="350000"/>
+              </a:schemeClr>
+            </a:gs>
+          </a:gsLst>
+          <a:lin ang="16200000" scaled="1"/>
+        </a:gradFill>
+        <a:gradFill rotWithShape="1">
+          <a:gsLst>
+            <a:gs pos="0">
+              <a:schemeClr val="phClr">
+                <a:shade val="51000"/>
+                <a:satMod val="130000"/>
+              </a:schemeClr>
+            </a:gs>
+            <a:gs pos="80000">
+              <a:schemeClr val="phClr">
+                <a:shade val="93000"/>
+                <a:satMod val="130000"/>
+              </a:schemeClr>
+            </a:gs>
+            <a:gs pos="100000">
+              <a:schemeClr val="phClr">
+                <a:shade val="94000"/>
+                <a:satMod val="135000"/>
+              </a:schemeClr>
+            </a:gs>
+          </a:gsLst>
+          <a:lin ang="16200000" scaled="0"/>
+        </a:gradFill>
+      </a:fillStyleLst>
+      <a:lnStyleLst>
+        <a:ln w="9525" cap="flat" cmpd="sng" algn="ctr">
+          <a:solidFill>
+            <a:schemeClr val="phClr">
+              <a:shade val="95000"/>
+              <a:satMod val="105000"/>
+            </a:schemeClr>
+          </a:solidFill>
+          <a:prstDash val="solid"/>
+        </a:ln>
+        <a:ln w="25400" cap="flat" cmpd="sng" algn="ctr">
+          <a:solidFill>
+            <a:schemeClr val="phClr"/>
+          </a:solidFill>
+          <a:prstDash val="solid"/>
+        </a:ln>
+        <a:ln w="38100" cap="flat" cmpd="sng" algn="ctr">
+          <a:solidFill>
+            <a:schemeClr val="phClr"/>
+          </a:solidFill>
+          <a:prstDash val="solid"/>
+        </a:ln>
+      </a:lnStyleLst>
+      <a:effectStyleLst>
+        <a:effectStyle>
+          <a:effectLst>
+            <a:outerShdw blurRad="40000" dist="20000" dir="5400000" rotWithShape="0">
+              <a:srgbClr val="000000">
+                <a:alpha val="38000"/>
+              </a:srgbClr>
+            </a:outerShdw>
+          </a:effectLst>
+        </a:effectStyle>
+        <a:effectStyle>
+          <a:effectLst>
+            <a:outerShdw blurRad="40000" dist="23000" dir="5400000" rotWithShape="0">
+              <a:srgbClr val="000000">
+                <a:alpha val="35000"/>
+              </a:srgbClr>
+            </a:outerShdw>
+          </a:effectLst>
+        </a:effectStyle>
+        <a:effectStyle>
+          <a:effectLst>
+            <a:outerShdw blurRad="40000" dist="23000" dir="5400000" rotWithShape="0">
+              <a:srgbClr val="000000">
+                <a:alpha val="35000"/>
+              </a:srgbClr>
+            </a:outerShdw>
+          </a:effectLst>
+          <a:scene3d>
+            <a:camera prst="orthographicFront">
+              <a:rot lat="0" lon="0" rev="0"/>
+            </a:camera>
+            <a:lightRig rig="threePt" dir="t">
+              <a:rot lat="0" lon="0" rev="1200000"/>
+            </a:lightRig>
+          </a:scene3d>
+          <a:sp3d>
+            <a:bevelT w="63500" h="25400"/>
+          </a:sp3d>
+        </a:effectStyle>
+      </a:effectStyleLst>
+      <a:bgFillStyleLst>
+        <a:solidFill>
+          <a:schemeClr val="phClr"/>
+        </a:solidFill>
+        <a:gradFill rotWithShape="1">
+          <a:gsLst>
+            <a:gs pos="0">
+              <a:schemeClr val="phClr">
+                <a:tint val="40000"/>
+                <a:satMod val="350000"/>
+              </a:schemeClr>
+            </a:gs>
+            <a:gs pos="40000">
+              <a:schemeClr val="phClr">
+                <a:tint val="45000"/>
+                <a:shade val="99000"/>
+                <a:satMod val="350000"/>
+              </a:schemeClr>
+            </a:gs>
+            <a:gs pos="100000">
+              <a:schemeClr val="phClr">
+                <a:shade val="20000"/>
+                <a:satMod val="255000"/>
+              </a:schemeClr>
+            </a:gs>
+          </a:gsLst>
+          <a:path path="circle">
+            <a:fillToRect l="50000" t="-80000" r="50000" b="180000"/>
+          </a:path>
+        </a:gradFill>
+        <a:gradFill rotWithShape="1">
+          <a:gsLst>
+            <a:gs pos="0">
+              <a:schemeClr val="phClr">
+                <a:tint val="80000"/>
+                <a:satMod val="300000"/>
+              </a:schemeClr>
+            </a:gs>
+            <a:gs pos="100000">
+              <a:schemeClr val="phClr">
+                <a:shade val="30000"/>
+                <a:satMod val="200000"/>
+              </a:schemeClr>
+            </a:gs>
+          </a:gsLst>
+          <a:path path="circle">
+            <a:fillToRect l="50000" t="50000" r="50000" b="50000"/>
+          </a:path>
+        </a:gradFill>
+      </a:bgFillStyleLst>
+    </a:fmtScheme>
+  </a:themeElements>
+  <a:objectDefaults/>
+  <a:extraClrSchemeLst/>
+</a:theme>
 </file>
</xml_diff>